<commit_message>
Added the web interface.
</commit_message>
<xml_diff>
--- a/doc/designDoc.pptx
+++ b/doc/designDoc.pptx
@@ -6,8 +6,9 @@
   </p:sldMasterIdLst>
   <p:sldIdLst>
     <p:sldId id="256" r:id="rId2"/>
-    <p:sldId id="258" r:id="rId3"/>
-    <p:sldId id="257" r:id="rId4"/>
+    <p:sldId id="259" r:id="rId3"/>
+    <p:sldId id="258" r:id="rId4"/>
+    <p:sldId id="257" r:id="rId5"/>
   </p:sldIdLst>
   <p:sldSz cx="12192000" cy="6858000"/>
   <p:notesSz cx="6858000" cy="9144000"/>
@@ -6130,6 +6131,1823 @@
   <p:cSld>
     <p:spTree>
       <p:nvGrpSpPr>
+        <p:cNvPr id="1" name=""/>
+        <p:cNvGrpSpPr/>
+        <p:nvPr/>
+      </p:nvGrpSpPr>
+      <p:grpSpPr>
+        <a:xfrm>
+          <a:off x="0" y="0"/>
+          <a:ext cx="0" cy="0"/>
+          <a:chOff x="0" y="0"/>
+          <a:chExt cx="0" cy="0"/>
+        </a:xfrm>
+      </p:grpSpPr>
+      <p:pic>
+        <p:nvPicPr>
+          <p:cNvPr id="4" name="Picture 3">
+            <a:extLst>
+              <a:ext uri="{FF2B5EF4-FFF2-40B4-BE49-F238E27FC236}">
+                <a16:creationId xmlns:a16="http://schemas.microsoft.com/office/drawing/2014/main" id="{76E8A552-3B33-89A4-6E60-0B054392A025}"/>
+              </a:ext>
+            </a:extLst>
+          </p:cNvPr>
+          <p:cNvPicPr>
+            <a:picLocks noChangeAspect="1"/>
+          </p:cNvPicPr>
+          <p:nvPr/>
+        </p:nvPicPr>
+        <p:blipFill>
+          <a:blip r:embed="rId2"/>
+          <a:stretch>
+            <a:fillRect/>
+          </a:stretch>
+        </p:blipFill>
+        <p:spPr>
+          <a:xfrm>
+            <a:off x="1317212" y="1933584"/>
+            <a:ext cx="551782" cy="636238"/>
+          </a:xfrm>
+          <a:prstGeom prst="rect">
+            <a:avLst/>
+          </a:prstGeom>
+          <a:ln w="9525">
+            <a:solidFill>
+              <a:schemeClr val="tx1"/>
+            </a:solidFill>
+          </a:ln>
+        </p:spPr>
+      </p:pic>
+      <p:cxnSp>
+        <p:nvCxnSpPr>
+          <p:cNvPr id="7" name="Straight Arrow Connector 6">
+            <a:extLst>
+              <a:ext uri="{FF2B5EF4-FFF2-40B4-BE49-F238E27FC236}">
+                <a16:creationId xmlns:a16="http://schemas.microsoft.com/office/drawing/2014/main" id="{BBF13B9E-E366-D9D2-262A-F2E8A5525755}"/>
+              </a:ext>
+            </a:extLst>
+          </p:cNvPr>
+          <p:cNvCxnSpPr>
+            <a:cxnSpLocks/>
+            <a:stCxn id="4" idx="3"/>
+          </p:cNvCxnSpPr>
+          <p:nvPr/>
+        </p:nvCxnSpPr>
+        <p:spPr>
+          <a:xfrm>
+            <a:off x="1868994" y="2251703"/>
+            <a:ext cx="241160" cy="0"/>
+          </a:xfrm>
+          <a:prstGeom prst="straightConnector1">
+            <a:avLst/>
+          </a:prstGeom>
+          <a:ln>
+            <a:solidFill>
+              <a:schemeClr val="accent6">
+                <a:lumMod val="75000"/>
+              </a:schemeClr>
+            </a:solidFill>
+            <a:tailEnd type="triangle"/>
+          </a:ln>
+        </p:spPr>
+        <p:style>
+          <a:lnRef idx="2">
+            <a:schemeClr val="accent1"/>
+          </a:lnRef>
+          <a:fillRef idx="0">
+            <a:schemeClr val="accent1"/>
+          </a:fillRef>
+          <a:effectRef idx="1">
+            <a:schemeClr val="accent1"/>
+          </a:effectRef>
+          <a:fontRef idx="minor">
+            <a:schemeClr val="tx1"/>
+          </a:fontRef>
+        </p:style>
+      </p:cxnSp>
+      <p:sp>
+        <p:nvSpPr>
+          <p:cNvPr id="11" name="Rectangle 10">
+            <a:extLst>
+              <a:ext uri="{FF2B5EF4-FFF2-40B4-BE49-F238E27FC236}">
+                <a16:creationId xmlns:a16="http://schemas.microsoft.com/office/drawing/2014/main" id="{EE69333A-905E-EBD1-C812-34ED145F051B}"/>
+              </a:ext>
+            </a:extLst>
+          </p:cNvPr>
+          <p:cNvSpPr/>
+          <p:nvPr/>
+        </p:nvSpPr>
+        <p:spPr>
+          <a:xfrm>
+            <a:off x="2141820" y="2042696"/>
+            <a:ext cx="1467936" cy="418011"/>
+          </a:xfrm>
+          <a:prstGeom prst="rect">
+            <a:avLst/>
+          </a:prstGeom>
+          <a:solidFill>
+            <a:schemeClr val="accent6">
+              <a:lumMod val="40000"/>
+              <a:lumOff val="60000"/>
+            </a:schemeClr>
+          </a:solidFill>
+        </p:spPr>
+        <p:style>
+          <a:lnRef idx="2">
+            <a:schemeClr val="accent1">
+              <a:shade val="15000"/>
+            </a:schemeClr>
+          </a:lnRef>
+          <a:fillRef idx="1">
+            <a:schemeClr val="accent1"/>
+          </a:fillRef>
+          <a:effectRef idx="0">
+            <a:schemeClr val="accent1"/>
+          </a:effectRef>
+          <a:fontRef idx="minor">
+            <a:schemeClr val="lt1"/>
+          </a:fontRef>
+        </p:style>
+        <p:txBody>
+          <a:bodyPr rtlCol="0" anchor="ctr"/>
+          <a:lstStyle/>
+          <a:p>
+            <a:pPr algn="ctr"/>
+            <a:r>
+              <a:rPr lang="en-US" sz="1200" b="1" dirty="0">
+                <a:solidFill>
+                  <a:schemeClr val="tx1"/>
+                </a:solidFill>
+              </a:rPr>
+              <a:t> AI-LLM Attack Scenario Analyzer</a:t>
+            </a:r>
+            <a:endParaRPr lang="en-SG" sz="1200" b="1" dirty="0">
+              <a:solidFill>
+                <a:schemeClr val="tx1"/>
+              </a:solidFill>
+            </a:endParaRPr>
+          </a:p>
+        </p:txBody>
+      </p:sp>
+      <p:cxnSp>
+        <p:nvCxnSpPr>
+          <p:cNvPr id="12" name="Straight Arrow Connector 11">
+            <a:extLst>
+              <a:ext uri="{FF2B5EF4-FFF2-40B4-BE49-F238E27FC236}">
+                <a16:creationId xmlns:a16="http://schemas.microsoft.com/office/drawing/2014/main" id="{DC91C8DD-B5A6-4178-6FAE-569FA38AE344}"/>
+              </a:ext>
+            </a:extLst>
+          </p:cNvPr>
+          <p:cNvCxnSpPr>
+            <a:cxnSpLocks/>
+            <a:endCxn id="13" idx="1"/>
+          </p:cNvCxnSpPr>
+          <p:nvPr/>
+        </p:nvCxnSpPr>
+        <p:spPr>
+          <a:xfrm>
+            <a:off x="3609756" y="2251701"/>
+            <a:ext cx="327033" cy="1"/>
+          </a:xfrm>
+          <a:prstGeom prst="straightConnector1">
+            <a:avLst/>
+          </a:prstGeom>
+          <a:ln>
+            <a:solidFill>
+              <a:schemeClr val="accent6">
+                <a:lumMod val="75000"/>
+              </a:schemeClr>
+            </a:solidFill>
+            <a:tailEnd type="triangle"/>
+          </a:ln>
+        </p:spPr>
+        <p:style>
+          <a:lnRef idx="2">
+            <a:schemeClr val="accent1"/>
+          </a:lnRef>
+          <a:fillRef idx="0">
+            <a:schemeClr val="accent1"/>
+          </a:fillRef>
+          <a:effectRef idx="1">
+            <a:schemeClr val="accent1"/>
+          </a:effectRef>
+          <a:fontRef idx="minor">
+            <a:schemeClr val="tx1"/>
+          </a:fontRef>
+        </p:style>
+      </p:cxnSp>
+      <p:pic>
+        <p:nvPicPr>
+          <p:cNvPr id="13" name="Picture 12">
+            <a:extLst>
+              <a:ext uri="{FF2B5EF4-FFF2-40B4-BE49-F238E27FC236}">
+                <a16:creationId xmlns:a16="http://schemas.microsoft.com/office/drawing/2014/main" id="{AE159177-7FE2-2643-53D7-4B70C23D7F95}"/>
+              </a:ext>
+            </a:extLst>
+          </p:cNvPr>
+          <p:cNvPicPr>
+            <a:picLocks noChangeAspect="1"/>
+          </p:cNvPicPr>
+          <p:nvPr/>
+        </p:nvPicPr>
+        <p:blipFill>
+          <a:blip r:embed="rId3"/>
+          <a:stretch>
+            <a:fillRect/>
+          </a:stretch>
+        </p:blipFill>
+        <p:spPr>
+          <a:xfrm>
+            <a:off x="3936789" y="1967176"/>
+            <a:ext cx="436045" cy="569052"/>
+          </a:xfrm>
+          <a:prstGeom prst="rect">
+            <a:avLst/>
+          </a:prstGeom>
+          <a:ln w="12700">
+            <a:solidFill>
+              <a:schemeClr val="tx1"/>
+            </a:solidFill>
+          </a:ln>
+        </p:spPr>
+      </p:pic>
+      <p:sp>
+        <p:nvSpPr>
+          <p:cNvPr id="14" name="Rectangle 13">
+            <a:extLst>
+              <a:ext uri="{FF2B5EF4-FFF2-40B4-BE49-F238E27FC236}">
+                <a16:creationId xmlns:a16="http://schemas.microsoft.com/office/drawing/2014/main" id="{188E24F5-8045-4126-6450-5B6835FE8E3D}"/>
+              </a:ext>
+            </a:extLst>
+          </p:cNvPr>
+          <p:cNvSpPr/>
+          <p:nvPr/>
+        </p:nvSpPr>
+        <p:spPr>
+          <a:xfrm>
+            <a:off x="4349518" y="3087296"/>
+            <a:ext cx="1746482" cy="418011"/>
+          </a:xfrm>
+          <a:prstGeom prst="rect">
+            <a:avLst/>
+          </a:prstGeom>
+          <a:solidFill>
+            <a:schemeClr val="accent2">
+              <a:lumMod val="40000"/>
+              <a:lumOff val="60000"/>
+            </a:schemeClr>
+          </a:solidFill>
+        </p:spPr>
+        <p:style>
+          <a:lnRef idx="2">
+            <a:schemeClr val="accent1">
+              <a:shade val="15000"/>
+            </a:schemeClr>
+          </a:lnRef>
+          <a:fillRef idx="1">
+            <a:schemeClr val="accent1"/>
+          </a:fillRef>
+          <a:effectRef idx="0">
+            <a:schemeClr val="accent1"/>
+          </a:effectRef>
+          <a:fontRef idx="minor">
+            <a:schemeClr val="lt1"/>
+          </a:fontRef>
+        </p:style>
+        <p:txBody>
+          <a:bodyPr rtlCol="0" anchor="ctr"/>
+          <a:lstStyle/>
+          <a:p>
+            <a:pPr algn="ctr"/>
+            <a:r>
+              <a:rPr lang="en-US" sz="1200" b="1" dirty="0">
+                <a:solidFill>
+                  <a:schemeClr val="tx1"/>
+                </a:solidFill>
+              </a:rPr>
+              <a:t>AI-LLM Attack Behaviors Analyzer</a:t>
+            </a:r>
+            <a:endParaRPr lang="en-SG" sz="1200" b="1" dirty="0">
+              <a:solidFill>
+                <a:schemeClr val="tx1"/>
+              </a:solidFill>
+            </a:endParaRPr>
+          </a:p>
+        </p:txBody>
+      </p:sp>
+      <p:cxnSp>
+        <p:nvCxnSpPr>
+          <p:cNvPr id="15" name="Straight Arrow Connector 14">
+            <a:extLst>
+              <a:ext uri="{FF2B5EF4-FFF2-40B4-BE49-F238E27FC236}">
+                <a16:creationId xmlns:a16="http://schemas.microsoft.com/office/drawing/2014/main" id="{04A580E6-6E77-3FC9-94F0-6B7D519219EE}"/>
+              </a:ext>
+            </a:extLst>
+          </p:cNvPr>
+          <p:cNvCxnSpPr>
+            <a:cxnSpLocks/>
+            <a:stCxn id="13" idx="2"/>
+            <a:endCxn id="14" idx="0"/>
+          </p:cNvCxnSpPr>
+          <p:nvPr/>
+        </p:nvCxnSpPr>
+        <p:spPr>
+          <a:xfrm>
+            <a:off x="4154812" y="2536228"/>
+            <a:ext cx="1067947" cy="551068"/>
+          </a:xfrm>
+          <a:prstGeom prst="straightConnector1">
+            <a:avLst/>
+          </a:prstGeom>
+          <a:ln>
+            <a:solidFill>
+              <a:schemeClr val="accent2">
+                <a:lumMod val="75000"/>
+              </a:schemeClr>
+            </a:solidFill>
+            <a:tailEnd type="triangle"/>
+          </a:ln>
+        </p:spPr>
+        <p:style>
+          <a:lnRef idx="2">
+            <a:schemeClr val="accent1"/>
+          </a:lnRef>
+          <a:fillRef idx="0">
+            <a:schemeClr val="accent1"/>
+          </a:fillRef>
+          <a:effectRef idx="1">
+            <a:schemeClr val="accent1"/>
+          </a:effectRef>
+          <a:fontRef idx="minor">
+            <a:schemeClr val="tx1"/>
+          </a:fontRef>
+        </p:style>
+      </p:cxnSp>
+      <p:sp>
+        <p:nvSpPr>
+          <p:cNvPr id="19" name="TextBox 18">
+            <a:extLst>
+              <a:ext uri="{FF2B5EF4-FFF2-40B4-BE49-F238E27FC236}">
+                <a16:creationId xmlns:a16="http://schemas.microsoft.com/office/drawing/2014/main" id="{1084A275-CA5D-6259-9920-B760A2C7C779}"/>
+              </a:ext>
+            </a:extLst>
+          </p:cNvPr>
+          <p:cNvSpPr txBox="1"/>
+          <p:nvPr/>
+        </p:nvSpPr>
+        <p:spPr>
+          <a:xfrm>
+            <a:off x="4396503" y="1951619"/>
+            <a:ext cx="2088558" cy="600164"/>
+          </a:xfrm>
+          <a:prstGeom prst="rect">
+            <a:avLst/>
+          </a:prstGeom>
+          <a:noFill/>
+        </p:spPr>
+        <p:txBody>
+          <a:bodyPr wrap="square" rtlCol="0">
+            <a:spAutoFit/>
+          </a:bodyPr>
+          <a:lstStyle/>
+          <a:p>
+            <a:r>
+              <a:rPr lang="en-US" sz="1100" b="1" dirty="0"/>
+              <a:t>Text format summary of the </a:t>
+            </a:r>
+          </a:p>
+          <a:p>
+            <a:r>
+              <a:rPr lang="en-US" sz="1100" b="1" dirty="0"/>
+              <a:t>attack flow path in the threats attack scenario </a:t>
+            </a:r>
+            <a:endParaRPr lang="en-SG" sz="1100" b="1" dirty="0"/>
+          </a:p>
+        </p:txBody>
+      </p:sp>
+      <p:cxnSp>
+        <p:nvCxnSpPr>
+          <p:cNvPr id="22" name="Straight Arrow Connector 21">
+            <a:extLst>
+              <a:ext uri="{FF2B5EF4-FFF2-40B4-BE49-F238E27FC236}">
+                <a16:creationId xmlns:a16="http://schemas.microsoft.com/office/drawing/2014/main" id="{611B437A-884A-ED70-E869-22A82A586D19}"/>
+              </a:ext>
+            </a:extLst>
+          </p:cNvPr>
+          <p:cNvCxnSpPr>
+            <a:cxnSpLocks/>
+            <a:stCxn id="13" idx="2"/>
+            <a:endCxn id="25" idx="0"/>
+          </p:cNvCxnSpPr>
+          <p:nvPr/>
+        </p:nvCxnSpPr>
+        <p:spPr>
+          <a:xfrm flipH="1">
+            <a:off x="3063548" y="2536228"/>
+            <a:ext cx="1091264" cy="599897"/>
+          </a:xfrm>
+          <a:prstGeom prst="straightConnector1">
+            <a:avLst/>
+          </a:prstGeom>
+          <a:ln>
+            <a:tailEnd type="triangle"/>
+          </a:ln>
+        </p:spPr>
+        <p:style>
+          <a:lnRef idx="2">
+            <a:schemeClr val="accent1"/>
+          </a:lnRef>
+          <a:fillRef idx="0">
+            <a:schemeClr val="accent1"/>
+          </a:fillRef>
+          <a:effectRef idx="1">
+            <a:schemeClr val="accent1"/>
+          </a:effectRef>
+          <a:fontRef idx="minor">
+            <a:schemeClr val="tx1"/>
+          </a:fontRef>
+        </p:style>
+      </p:cxnSp>
+      <p:sp>
+        <p:nvSpPr>
+          <p:cNvPr id="25" name="Rectangle 24">
+            <a:extLst>
+              <a:ext uri="{FF2B5EF4-FFF2-40B4-BE49-F238E27FC236}">
+                <a16:creationId xmlns:a16="http://schemas.microsoft.com/office/drawing/2014/main" id="{E7F988AA-AA85-6283-90F6-85FDBE53B299}"/>
+              </a:ext>
+            </a:extLst>
+          </p:cNvPr>
+          <p:cNvSpPr/>
+          <p:nvPr/>
+        </p:nvSpPr>
+        <p:spPr>
+          <a:xfrm>
+            <a:off x="2190307" y="3136125"/>
+            <a:ext cx="1746482" cy="418011"/>
+          </a:xfrm>
+          <a:prstGeom prst="rect">
+            <a:avLst/>
+          </a:prstGeom>
+          <a:solidFill>
+            <a:schemeClr val="tx2">
+              <a:lumMod val="25000"/>
+              <a:lumOff val="75000"/>
+            </a:schemeClr>
+          </a:solidFill>
+        </p:spPr>
+        <p:style>
+          <a:lnRef idx="2">
+            <a:schemeClr val="accent1">
+              <a:shade val="15000"/>
+            </a:schemeClr>
+          </a:lnRef>
+          <a:fillRef idx="1">
+            <a:schemeClr val="accent1"/>
+          </a:fillRef>
+          <a:effectRef idx="0">
+            <a:schemeClr val="accent1"/>
+          </a:effectRef>
+          <a:fontRef idx="minor">
+            <a:schemeClr val="lt1"/>
+          </a:fontRef>
+        </p:style>
+        <p:txBody>
+          <a:bodyPr rtlCol="0" anchor="ctr"/>
+          <a:lstStyle/>
+          <a:p>
+            <a:pPr algn="ctr"/>
+            <a:r>
+              <a:rPr lang="en-US" sz="1200" b="1" dirty="0">
+                <a:solidFill>
+                  <a:schemeClr val="tx1"/>
+                </a:solidFill>
+              </a:rPr>
+              <a:t>AI-LLM Vulnerabilities Analyzer</a:t>
+            </a:r>
+            <a:endParaRPr lang="en-SG" sz="1200" b="1" dirty="0">
+              <a:solidFill>
+                <a:schemeClr val="tx1"/>
+              </a:solidFill>
+            </a:endParaRPr>
+          </a:p>
+        </p:txBody>
+      </p:sp>
+      <p:cxnSp>
+        <p:nvCxnSpPr>
+          <p:cNvPr id="28" name="Straight Arrow Connector 27">
+            <a:extLst>
+              <a:ext uri="{FF2B5EF4-FFF2-40B4-BE49-F238E27FC236}">
+                <a16:creationId xmlns:a16="http://schemas.microsoft.com/office/drawing/2014/main" id="{41767963-4203-3413-B040-2DDFFEADADD4}"/>
+              </a:ext>
+            </a:extLst>
+          </p:cNvPr>
+          <p:cNvCxnSpPr>
+            <a:cxnSpLocks/>
+            <a:stCxn id="14" idx="2"/>
+            <a:endCxn id="31" idx="0"/>
+          </p:cNvCxnSpPr>
+          <p:nvPr/>
+        </p:nvCxnSpPr>
+        <p:spPr>
+          <a:xfrm>
+            <a:off x="5222759" y="3505307"/>
+            <a:ext cx="0" cy="342062"/>
+          </a:xfrm>
+          <a:prstGeom prst="straightConnector1">
+            <a:avLst/>
+          </a:prstGeom>
+          <a:ln>
+            <a:solidFill>
+              <a:schemeClr val="accent2">
+                <a:lumMod val="75000"/>
+              </a:schemeClr>
+            </a:solidFill>
+            <a:tailEnd type="triangle"/>
+          </a:ln>
+        </p:spPr>
+        <p:style>
+          <a:lnRef idx="2">
+            <a:schemeClr val="accent1"/>
+          </a:lnRef>
+          <a:fillRef idx="0">
+            <a:schemeClr val="accent1"/>
+          </a:fillRef>
+          <a:effectRef idx="1">
+            <a:schemeClr val="accent1"/>
+          </a:effectRef>
+          <a:fontRef idx="minor">
+            <a:schemeClr val="tx1"/>
+          </a:fontRef>
+        </p:style>
+      </p:cxnSp>
+      <p:sp>
+        <p:nvSpPr>
+          <p:cNvPr id="31" name="Rectangle 30">
+            <a:extLst>
+              <a:ext uri="{FF2B5EF4-FFF2-40B4-BE49-F238E27FC236}">
+                <a16:creationId xmlns:a16="http://schemas.microsoft.com/office/drawing/2014/main" id="{FC627C44-1067-E00B-87B6-85481201E66D}"/>
+              </a:ext>
+            </a:extLst>
+          </p:cNvPr>
+          <p:cNvSpPr/>
+          <p:nvPr/>
+        </p:nvSpPr>
+        <p:spPr>
+          <a:xfrm>
+            <a:off x="4349518" y="3847369"/>
+            <a:ext cx="1746482" cy="418011"/>
+          </a:xfrm>
+          <a:prstGeom prst="rect">
+            <a:avLst/>
+          </a:prstGeom>
+          <a:solidFill>
+            <a:schemeClr val="accent2">
+              <a:lumMod val="40000"/>
+              <a:lumOff val="60000"/>
+            </a:schemeClr>
+          </a:solidFill>
+        </p:spPr>
+        <p:style>
+          <a:lnRef idx="2">
+            <a:schemeClr val="accent1">
+              <a:shade val="15000"/>
+            </a:schemeClr>
+          </a:lnRef>
+          <a:fillRef idx="1">
+            <a:schemeClr val="accent1"/>
+          </a:fillRef>
+          <a:effectRef idx="0">
+            <a:schemeClr val="accent1"/>
+          </a:effectRef>
+          <a:fontRef idx="minor">
+            <a:schemeClr val="lt1"/>
+          </a:fontRef>
+        </p:style>
+        <p:txBody>
+          <a:bodyPr rtlCol="0" anchor="ctr"/>
+          <a:lstStyle/>
+          <a:p>
+            <a:pPr algn="ctr"/>
+            <a:r>
+              <a:rPr lang="en-US" sz="1200" b="1" dirty="0">
+                <a:solidFill>
+                  <a:schemeClr val="tx1"/>
+                </a:solidFill>
+              </a:rPr>
+              <a:t>AI-LLM MITRE ATT&amp;CK Matrix Mapper </a:t>
+            </a:r>
+            <a:endParaRPr lang="en-SG" sz="1200" b="1" dirty="0">
+              <a:solidFill>
+                <a:schemeClr val="tx1"/>
+              </a:solidFill>
+            </a:endParaRPr>
+          </a:p>
+        </p:txBody>
+      </p:sp>
+      <p:sp>
+        <p:nvSpPr>
+          <p:cNvPr id="32" name="Rectangle 31">
+            <a:extLst>
+              <a:ext uri="{FF2B5EF4-FFF2-40B4-BE49-F238E27FC236}">
+                <a16:creationId xmlns:a16="http://schemas.microsoft.com/office/drawing/2014/main" id="{673E1F62-50EE-FC32-EC3D-8E1C98A3F4F0}"/>
+              </a:ext>
+            </a:extLst>
+          </p:cNvPr>
+          <p:cNvSpPr/>
+          <p:nvPr/>
+        </p:nvSpPr>
+        <p:spPr>
+          <a:xfrm>
+            <a:off x="2190307" y="3859227"/>
+            <a:ext cx="1746482" cy="418011"/>
+          </a:xfrm>
+          <a:prstGeom prst="rect">
+            <a:avLst/>
+          </a:prstGeom>
+          <a:solidFill>
+            <a:schemeClr val="tx2">
+              <a:lumMod val="25000"/>
+              <a:lumOff val="75000"/>
+            </a:schemeClr>
+          </a:solidFill>
+        </p:spPr>
+        <p:style>
+          <a:lnRef idx="2">
+            <a:schemeClr val="accent1">
+              <a:shade val="15000"/>
+            </a:schemeClr>
+          </a:lnRef>
+          <a:fillRef idx="1">
+            <a:schemeClr val="accent1"/>
+          </a:fillRef>
+          <a:effectRef idx="0">
+            <a:schemeClr val="accent1"/>
+          </a:effectRef>
+          <a:fontRef idx="minor">
+            <a:schemeClr val="lt1"/>
+          </a:fontRef>
+        </p:style>
+        <p:txBody>
+          <a:bodyPr rtlCol="0" anchor="ctr"/>
+          <a:lstStyle/>
+          <a:p>
+            <a:pPr algn="ctr"/>
+            <a:r>
+              <a:rPr lang="en-US" sz="1200" b="1" dirty="0">
+                <a:solidFill>
+                  <a:schemeClr val="tx1"/>
+                </a:solidFill>
+              </a:rPr>
+              <a:t>AI-LLM MITRE CWE TREE Matcher </a:t>
+            </a:r>
+            <a:endParaRPr lang="en-SG" sz="1200" b="1" dirty="0">
+              <a:solidFill>
+                <a:schemeClr val="tx1"/>
+              </a:solidFill>
+            </a:endParaRPr>
+          </a:p>
+        </p:txBody>
+      </p:sp>
+      <p:cxnSp>
+        <p:nvCxnSpPr>
+          <p:cNvPr id="33" name="Straight Arrow Connector 32">
+            <a:extLst>
+              <a:ext uri="{FF2B5EF4-FFF2-40B4-BE49-F238E27FC236}">
+                <a16:creationId xmlns:a16="http://schemas.microsoft.com/office/drawing/2014/main" id="{9E101171-53DB-1980-DCB2-B570DAB646FB}"/>
+              </a:ext>
+            </a:extLst>
+          </p:cNvPr>
+          <p:cNvCxnSpPr>
+            <a:cxnSpLocks/>
+            <a:stCxn id="25" idx="2"/>
+            <a:endCxn id="32" idx="0"/>
+          </p:cNvCxnSpPr>
+          <p:nvPr/>
+        </p:nvCxnSpPr>
+        <p:spPr>
+          <a:xfrm>
+            <a:off x="3063548" y="3554136"/>
+            <a:ext cx="0" cy="305091"/>
+          </a:xfrm>
+          <a:prstGeom prst="straightConnector1">
+            <a:avLst/>
+          </a:prstGeom>
+          <a:ln>
+            <a:tailEnd type="triangle"/>
+          </a:ln>
+        </p:spPr>
+        <p:style>
+          <a:lnRef idx="2">
+            <a:schemeClr val="accent1"/>
+          </a:lnRef>
+          <a:fillRef idx="0">
+            <a:schemeClr val="accent1"/>
+          </a:fillRef>
+          <a:effectRef idx="1">
+            <a:schemeClr val="accent1"/>
+          </a:effectRef>
+          <a:fontRef idx="minor">
+            <a:schemeClr val="tx1"/>
+          </a:fontRef>
+        </p:style>
+      </p:cxnSp>
+      <p:sp>
+        <p:nvSpPr>
+          <p:cNvPr id="52" name="Rectangle 51">
+            <a:extLst>
+              <a:ext uri="{FF2B5EF4-FFF2-40B4-BE49-F238E27FC236}">
+                <a16:creationId xmlns:a16="http://schemas.microsoft.com/office/drawing/2014/main" id="{D463FF95-53E8-1209-C41C-699D00E9494E}"/>
+              </a:ext>
+            </a:extLst>
+          </p:cNvPr>
+          <p:cNvSpPr/>
+          <p:nvPr/>
+        </p:nvSpPr>
+        <p:spPr>
+          <a:xfrm>
+            <a:off x="3281570" y="4733299"/>
+            <a:ext cx="1746482" cy="418011"/>
+          </a:xfrm>
+          <a:prstGeom prst="rect">
+            <a:avLst/>
+          </a:prstGeom>
+          <a:solidFill>
+            <a:schemeClr val="bg1">
+              <a:lumMod val="85000"/>
+            </a:schemeClr>
+          </a:solidFill>
+        </p:spPr>
+        <p:style>
+          <a:lnRef idx="2">
+            <a:schemeClr val="accent1">
+              <a:shade val="15000"/>
+            </a:schemeClr>
+          </a:lnRef>
+          <a:fillRef idx="1">
+            <a:schemeClr val="accent1"/>
+          </a:fillRef>
+          <a:effectRef idx="0">
+            <a:schemeClr val="accent1"/>
+          </a:effectRef>
+          <a:fontRef idx="minor">
+            <a:schemeClr val="lt1"/>
+          </a:fontRef>
+        </p:style>
+        <p:txBody>
+          <a:bodyPr rtlCol="0" anchor="ctr"/>
+          <a:lstStyle/>
+          <a:p>
+            <a:pPr algn="ctr"/>
+            <a:r>
+              <a:rPr lang="en-US" sz="1200" b="1" dirty="0">
+                <a:solidFill>
+                  <a:schemeClr val="tx1"/>
+                </a:solidFill>
+              </a:rPr>
+              <a:t>AI-LLM Result Verifier </a:t>
+            </a:r>
+            <a:endParaRPr lang="en-SG" sz="1200" b="1" dirty="0">
+              <a:solidFill>
+                <a:schemeClr val="tx1"/>
+              </a:solidFill>
+            </a:endParaRPr>
+          </a:p>
+        </p:txBody>
+      </p:sp>
+      <p:cxnSp>
+        <p:nvCxnSpPr>
+          <p:cNvPr id="53" name="Straight Arrow Connector 52">
+            <a:extLst>
+              <a:ext uri="{FF2B5EF4-FFF2-40B4-BE49-F238E27FC236}">
+                <a16:creationId xmlns:a16="http://schemas.microsoft.com/office/drawing/2014/main" id="{42BA963A-5950-416E-1C65-EAA7484D2B26}"/>
+              </a:ext>
+            </a:extLst>
+          </p:cNvPr>
+          <p:cNvCxnSpPr>
+            <a:cxnSpLocks/>
+            <a:stCxn id="32" idx="2"/>
+            <a:endCxn id="52" idx="0"/>
+          </p:cNvCxnSpPr>
+          <p:nvPr/>
+        </p:nvCxnSpPr>
+        <p:spPr>
+          <a:xfrm>
+            <a:off x="3063548" y="4277238"/>
+            <a:ext cx="1091263" cy="456061"/>
+          </a:xfrm>
+          <a:prstGeom prst="straightConnector1">
+            <a:avLst/>
+          </a:prstGeom>
+          <a:ln>
+            <a:tailEnd type="triangle"/>
+          </a:ln>
+        </p:spPr>
+        <p:style>
+          <a:lnRef idx="2">
+            <a:schemeClr val="accent1"/>
+          </a:lnRef>
+          <a:fillRef idx="0">
+            <a:schemeClr val="accent1"/>
+          </a:fillRef>
+          <a:effectRef idx="1">
+            <a:schemeClr val="accent1"/>
+          </a:effectRef>
+          <a:fontRef idx="minor">
+            <a:schemeClr val="tx1"/>
+          </a:fontRef>
+        </p:style>
+      </p:cxnSp>
+      <p:cxnSp>
+        <p:nvCxnSpPr>
+          <p:cNvPr id="56" name="Straight Arrow Connector 55">
+            <a:extLst>
+              <a:ext uri="{FF2B5EF4-FFF2-40B4-BE49-F238E27FC236}">
+                <a16:creationId xmlns:a16="http://schemas.microsoft.com/office/drawing/2014/main" id="{F071FFF5-800F-27E9-E070-5AB828E898CD}"/>
+              </a:ext>
+            </a:extLst>
+          </p:cNvPr>
+          <p:cNvCxnSpPr>
+            <a:cxnSpLocks/>
+            <a:stCxn id="31" idx="2"/>
+            <a:endCxn id="52" idx="0"/>
+          </p:cNvCxnSpPr>
+          <p:nvPr/>
+        </p:nvCxnSpPr>
+        <p:spPr>
+          <a:xfrm flipH="1">
+            <a:off x="4154811" y="4265380"/>
+            <a:ext cx="1067948" cy="467919"/>
+          </a:xfrm>
+          <a:prstGeom prst="straightConnector1">
+            <a:avLst/>
+          </a:prstGeom>
+          <a:ln>
+            <a:solidFill>
+              <a:schemeClr val="accent2">
+                <a:lumMod val="75000"/>
+              </a:schemeClr>
+            </a:solidFill>
+            <a:tailEnd type="triangle"/>
+          </a:ln>
+        </p:spPr>
+        <p:style>
+          <a:lnRef idx="2">
+            <a:schemeClr val="accent1"/>
+          </a:lnRef>
+          <a:fillRef idx="0">
+            <a:schemeClr val="accent1"/>
+          </a:fillRef>
+          <a:effectRef idx="1">
+            <a:schemeClr val="accent1"/>
+          </a:effectRef>
+          <a:fontRef idx="minor">
+            <a:schemeClr val="tx1"/>
+          </a:fontRef>
+        </p:style>
+      </p:cxnSp>
+      <p:cxnSp>
+        <p:nvCxnSpPr>
+          <p:cNvPr id="59" name="Straight Arrow Connector 58">
+            <a:extLst>
+              <a:ext uri="{FF2B5EF4-FFF2-40B4-BE49-F238E27FC236}">
+                <a16:creationId xmlns:a16="http://schemas.microsoft.com/office/drawing/2014/main" id="{28F6103E-BB78-07EC-4BBF-4F92C607AC7B}"/>
+              </a:ext>
+            </a:extLst>
+          </p:cNvPr>
+          <p:cNvCxnSpPr>
+            <a:cxnSpLocks/>
+            <a:stCxn id="52" idx="3"/>
+          </p:cNvCxnSpPr>
+          <p:nvPr/>
+        </p:nvCxnSpPr>
+        <p:spPr>
+          <a:xfrm flipV="1">
+            <a:off x="5028052" y="4942304"/>
+            <a:ext cx="377961" cy="1"/>
+          </a:xfrm>
+          <a:prstGeom prst="straightConnector1">
+            <a:avLst/>
+          </a:prstGeom>
+          <a:ln>
+            <a:tailEnd type="triangle"/>
+          </a:ln>
+        </p:spPr>
+        <p:style>
+          <a:lnRef idx="2">
+            <a:schemeClr val="accent1"/>
+          </a:lnRef>
+          <a:fillRef idx="0">
+            <a:schemeClr val="accent1"/>
+          </a:fillRef>
+          <a:effectRef idx="1">
+            <a:schemeClr val="accent1"/>
+          </a:effectRef>
+          <a:fontRef idx="minor">
+            <a:schemeClr val="tx1"/>
+          </a:fontRef>
+        </p:style>
+      </p:cxnSp>
+      <p:sp>
+        <p:nvSpPr>
+          <p:cNvPr id="63" name="Rectangle 62">
+            <a:extLst>
+              <a:ext uri="{FF2B5EF4-FFF2-40B4-BE49-F238E27FC236}">
+                <a16:creationId xmlns:a16="http://schemas.microsoft.com/office/drawing/2014/main" id="{50F3B9EA-EC84-DD1B-FE6C-5923E90434BD}"/>
+              </a:ext>
+            </a:extLst>
+          </p:cNvPr>
+          <p:cNvSpPr/>
+          <p:nvPr/>
+        </p:nvSpPr>
+        <p:spPr>
+          <a:xfrm>
+            <a:off x="5417468" y="4734349"/>
+            <a:ext cx="973284" cy="418011"/>
+          </a:xfrm>
+          <a:prstGeom prst="rect">
+            <a:avLst/>
+          </a:prstGeom>
+          <a:solidFill>
+            <a:schemeClr val="bg1">
+              <a:lumMod val="85000"/>
+            </a:schemeClr>
+          </a:solidFill>
+        </p:spPr>
+        <p:style>
+          <a:lnRef idx="2">
+            <a:schemeClr val="accent1">
+              <a:shade val="15000"/>
+            </a:schemeClr>
+          </a:lnRef>
+          <a:fillRef idx="1">
+            <a:schemeClr val="accent1"/>
+          </a:fillRef>
+          <a:effectRef idx="0">
+            <a:schemeClr val="accent1"/>
+          </a:effectRef>
+          <a:fontRef idx="minor">
+            <a:schemeClr val="lt1"/>
+          </a:fontRef>
+        </p:style>
+        <p:txBody>
+          <a:bodyPr rtlCol="0" anchor="ctr"/>
+          <a:lstStyle/>
+          <a:p>
+            <a:pPr algn="ctr"/>
+            <a:r>
+              <a:rPr lang="en-US" sz="1200" b="1" dirty="0">
+                <a:solidFill>
+                  <a:schemeClr val="tx1"/>
+                </a:solidFill>
+              </a:rPr>
+              <a:t>Report Generator </a:t>
+            </a:r>
+            <a:endParaRPr lang="en-SG" sz="1200" b="1" dirty="0">
+              <a:solidFill>
+                <a:schemeClr val="tx1"/>
+              </a:solidFill>
+            </a:endParaRPr>
+          </a:p>
+        </p:txBody>
+      </p:sp>
+      <p:cxnSp>
+        <p:nvCxnSpPr>
+          <p:cNvPr id="64" name="Straight Arrow Connector 63">
+            <a:extLst>
+              <a:ext uri="{FF2B5EF4-FFF2-40B4-BE49-F238E27FC236}">
+                <a16:creationId xmlns:a16="http://schemas.microsoft.com/office/drawing/2014/main" id="{589C4F99-7D26-CE4C-1C45-9946224788ED}"/>
+              </a:ext>
+            </a:extLst>
+          </p:cNvPr>
+          <p:cNvCxnSpPr>
+            <a:cxnSpLocks/>
+          </p:cNvCxnSpPr>
+          <p:nvPr/>
+        </p:nvCxnSpPr>
+        <p:spPr>
+          <a:xfrm flipV="1">
+            <a:off x="6396480" y="4592097"/>
+            <a:ext cx="378054" cy="350207"/>
+          </a:xfrm>
+          <a:prstGeom prst="straightConnector1">
+            <a:avLst/>
+          </a:prstGeom>
+          <a:ln>
+            <a:solidFill>
+              <a:schemeClr val="accent2">
+                <a:lumMod val="75000"/>
+              </a:schemeClr>
+            </a:solidFill>
+            <a:tailEnd type="triangle"/>
+          </a:ln>
+        </p:spPr>
+        <p:style>
+          <a:lnRef idx="2">
+            <a:schemeClr val="accent1"/>
+          </a:lnRef>
+          <a:fillRef idx="0">
+            <a:schemeClr val="accent1"/>
+          </a:fillRef>
+          <a:effectRef idx="1">
+            <a:schemeClr val="accent1"/>
+          </a:effectRef>
+          <a:fontRef idx="minor">
+            <a:schemeClr val="tx1"/>
+          </a:fontRef>
+        </p:style>
+      </p:cxnSp>
+      <p:cxnSp>
+        <p:nvCxnSpPr>
+          <p:cNvPr id="66" name="Straight Arrow Connector 65">
+            <a:extLst>
+              <a:ext uri="{FF2B5EF4-FFF2-40B4-BE49-F238E27FC236}">
+                <a16:creationId xmlns:a16="http://schemas.microsoft.com/office/drawing/2014/main" id="{0F004976-8EDE-79AE-5BEE-1603249DE089}"/>
+              </a:ext>
+            </a:extLst>
+          </p:cNvPr>
+          <p:cNvCxnSpPr>
+            <a:cxnSpLocks/>
+            <a:stCxn id="63" idx="3"/>
+            <a:endCxn id="71" idx="1"/>
+          </p:cNvCxnSpPr>
+          <p:nvPr/>
+        </p:nvCxnSpPr>
+        <p:spPr>
+          <a:xfrm>
+            <a:off x="6390752" y="4943355"/>
+            <a:ext cx="388652" cy="282118"/>
+          </a:xfrm>
+          <a:prstGeom prst="straightConnector1">
+            <a:avLst/>
+          </a:prstGeom>
+          <a:ln>
+            <a:tailEnd type="triangle"/>
+          </a:ln>
+        </p:spPr>
+        <p:style>
+          <a:lnRef idx="2">
+            <a:schemeClr val="accent1"/>
+          </a:lnRef>
+          <a:fillRef idx="0">
+            <a:schemeClr val="accent1"/>
+          </a:fillRef>
+          <a:effectRef idx="1">
+            <a:schemeClr val="accent1"/>
+          </a:effectRef>
+          <a:fontRef idx="minor">
+            <a:schemeClr val="tx1"/>
+          </a:fontRef>
+        </p:style>
+      </p:cxnSp>
+      <p:pic>
+        <p:nvPicPr>
+          <p:cNvPr id="69" name="Picture 68">
+            <a:extLst>
+              <a:ext uri="{FF2B5EF4-FFF2-40B4-BE49-F238E27FC236}">
+                <a16:creationId xmlns:a16="http://schemas.microsoft.com/office/drawing/2014/main" id="{D2ECE2CD-6FF3-F8F1-678F-2F7B2C5CA31E}"/>
+              </a:ext>
+            </a:extLst>
+          </p:cNvPr>
+          <p:cNvPicPr>
+            <a:picLocks noChangeAspect="1"/>
+          </p:cNvPicPr>
+          <p:nvPr/>
+        </p:nvPicPr>
+        <p:blipFill>
+          <a:blip r:embed="rId4"/>
+          <a:stretch>
+            <a:fillRect/>
+          </a:stretch>
+        </p:blipFill>
+        <p:spPr>
+          <a:xfrm>
+            <a:off x="6774534" y="4349710"/>
+            <a:ext cx="403934" cy="483723"/>
+          </a:xfrm>
+          <a:prstGeom prst="rect">
+            <a:avLst/>
+          </a:prstGeom>
+          <a:ln w="19050">
+            <a:solidFill>
+              <a:schemeClr val="accent2">
+                <a:lumMod val="75000"/>
+              </a:schemeClr>
+            </a:solidFill>
+          </a:ln>
+        </p:spPr>
+      </p:pic>
+      <p:sp>
+        <p:nvSpPr>
+          <p:cNvPr id="70" name="TextBox 69">
+            <a:extLst>
+              <a:ext uri="{FF2B5EF4-FFF2-40B4-BE49-F238E27FC236}">
+                <a16:creationId xmlns:a16="http://schemas.microsoft.com/office/drawing/2014/main" id="{D02621B1-52D1-2EAF-459F-8CB6EEED987D}"/>
+              </a:ext>
+            </a:extLst>
+          </p:cNvPr>
+          <p:cNvSpPr txBox="1"/>
+          <p:nvPr/>
+        </p:nvSpPr>
+        <p:spPr>
+          <a:xfrm>
+            <a:off x="7152495" y="4291489"/>
+            <a:ext cx="1233191" cy="600164"/>
+          </a:xfrm>
+          <a:prstGeom prst="rect">
+            <a:avLst/>
+          </a:prstGeom>
+          <a:noFill/>
+        </p:spPr>
+        <p:txBody>
+          <a:bodyPr wrap="square" rtlCol="0">
+            <a:spAutoFit/>
+          </a:bodyPr>
+          <a:lstStyle/>
+          <a:p>
+            <a:r>
+              <a:rPr lang="en-US" sz="1100" b="1" dirty="0">
+                <a:solidFill>
+                  <a:schemeClr val="accent2">
+                    <a:lumMod val="75000"/>
+                  </a:schemeClr>
+                </a:solidFill>
+              </a:rPr>
+              <a:t>MITRE ATT&amp;CK Technique  mapping report</a:t>
+            </a:r>
+            <a:endParaRPr lang="en-SG" sz="1100" b="1" dirty="0">
+              <a:solidFill>
+                <a:schemeClr val="accent2">
+                  <a:lumMod val="75000"/>
+                </a:schemeClr>
+              </a:solidFill>
+            </a:endParaRPr>
+          </a:p>
+        </p:txBody>
+      </p:sp>
+      <p:pic>
+        <p:nvPicPr>
+          <p:cNvPr id="71" name="Picture 70">
+            <a:extLst>
+              <a:ext uri="{FF2B5EF4-FFF2-40B4-BE49-F238E27FC236}">
+                <a16:creationId xmlns:a16="http://schemas.microsoft.com/office/drawing/2014/main" id="{E5DE2E96-3B41-CC35-5DFA-9549B5E64A7C}"/>
+              </a:ext>
+            </a:extLst>
+          </p:cNvPr>
+          <p:cNvPicPr>
+            <a:picLocks noChangeAspect="1"/>
+          </p:cNvPicPr>
+          <p:nvPr/>
+        </p:nvPicPr>
+        <p:blipFill>
+          <a:blip r:embed="rId4"/>
+          <a:stretch>
+            <a:fillRect/>
+          </a:stretch>
+        </p:blipFill>
+        <p:spPr>
+          <a:xfrm>
+            <a:off x="6779404" y="4983611"/>
+            <a:ext cx="403934" cy="483723"/>
+          </a:xfrm>
+          <a:prstGeom prst="rect">
+            <a:avLst/>
+          </a:prstGeom>
+          <a:ln w="19050">
+            <a:solidFill>
+              <a:schemeClr val="tx2">
+                <a:lumMod val="75000"/>
+                <a:lumOff val="25000"/>
+              </a:schemeClr>
+            </a:solidFill>
+          </a:ln>
+        </p:spPr>
+      </p:pic>
+      <p:sp>
+        <p:nvSpPr>
+          <p:cNvPr id="72" name="TextBox 71">
+            <a:extLst>
+              <a:ext uri="{FF2B5EF4-FFF2-40B4-BE49-F238E27FC236}">
+                <a16:creationId xmlns:a16="http://schemas.microsoft.com/office/drawing/2014/main" id="{766E7038-0CF4-92FA-376D-8D39AD5E4F7D}"/>
+              </a:ext>
+            </a:extLst>
+          </p:cNvPr>
+          <p:cNvSpPr txBox="1"/>
+          <p:nvPr/>
+        </p:nvSpPr>
+        <p:spPr>
+          <a:xfrm>
+            <a:off x="7178468" y="4925390"/>
+            <a:ext cx="1233191" cy="600164"/>
+          </a:xfrm>
+          <a:prstGeom prst="rect">
+            <a:avLst/>
+          </a:prstGeom>
+          <a:noFill/>
+        </p:spPr>
+        <p:txBody>
+          <a:bodyPr wrap="square" rtlCol="0">
+            <a:spAutoFit/>
+          </a:bodyPr>
+          <a:lstStyle/>
+          <a:p>
+            <a:r>
+              <a:rPr lang="en-US" sz="1100" b="1" dirty="0">
+                <a:solidFill>
+                  <a:schemeClr val="tx2">
+                    <a:lumMod val="75000"/>
+                    <a:lumOff val="25000"/>
+                  </a:schemeClr>
+                </a:solidFill>
+              </a:rPr>
+              <a:t>MITRE CWE Vulnerability matching report</a:t>
+            </a:r>
+            <a:endParaRPr lang="en-SG" sz="1100" b="1" dirty="0">
+              <a:solidFill>
+                <a:schemeClr val="tx2">
+                  <a:lumMod val="75000"/>
+                  <a:lumOff val="25000"/>
+                </a:schemeClr>
+              </a:solidFill>
+            </a:endParaRPr>
+          </a:p>
+        </p:txBody>
+      </p:sp>
+      <p:cxnSp>
+        <p:nvCxnSpPr>
+          <p:cNvPr id="74" name="Connector: Elbow 73">
+            <a:extLst>
+              <a:ext uri="{FF2B5EF4-FFF2-40B4-BE49-F238E27FC236}">
+                <a16:creationId xmlns:a16="http://schemas.microsoft.com/office/drawing/2014/main" id="{56A41BF5-FC24-89E9-4095-CA000072DB47}"/>
+              </a:ext>
+            </a:extLst>
+          </p:cNvPr>
+          <p:cNvCxnSpPr>
+            <a:stCxn id="4" idx="2"/>
+            <a:endCxn id="52" idx="1"/>
+          </p:cNvCxnSpPr>
+          <p:nvPr/>
+        </p:nvCxnSpPr>
+        <p:spPr>
+          <a:xfrm rot="16200000" flipH="1">
+            <a:off x="1251095" y="2911829"/>
+            <a:ext cx="2372483" cy="1688467"/>
+          </a:xfrm>
+          <a:prstGeom prst="bentConnector2">
+            <a:avLst/>
+          </a:prstGeom>
+          <a:ln>
+            <a:solidFill>
+              <a:srgbClr val="00B050"/>
+            </a:solidFill>
+            <a:tailEnd type="triangle"/>
+          </a:ln>
+        </p:spPr>
+        <p:style>
+          <a:lnRef idx="2">
+            <a:schemeClr val="accent1"/>
+          </a:lnRef>
+          <a:fillRef idx="0">
+            <a:schemeClr val="accent1"/>
+          </a:fillRef>
+          <a:effectRef idx="1">
+            <a:schemeClr val="accent1"/>
+          </a:effectRef>
+          <a:fontRef idx="minor">
+            <a:schemeClr val="tx1"/>
+          </a:fontRef>
+        </p:style>
+      </p:cxnSp>
+      <p:sp>
+        <p:nvSpPr>
+          <p:cNvPr id="5" name="TextBox 4">
+            <a:extLst>
+              <a:ext uri="{FF2B5EF4-FFF2-40B4-BE49-F238E27FC236}">
+                <a16:creationId xmlns:a16="http://schemas.microsoft.com/office/drawing/2014/main" id="{62F7B1D7-3957-AB64-4A8E-9CC7ABC978AF}"/>
+              </a:ext>
+            </a:extLst>
+          </p:cNvPr>
+          <p:cNvSpPr txBox="1"/>
+          <p:nvPr/>
+        </p:nvSpPr>
+        <p:spPr>
+          <a:xfrm>
+            <a:off x="1164083" y="2562803"/>
+            <a:ext cx="1302188" cy="769441"/>
+          </a:xfrm>
+          <a:prstGeom prst="rect">
+            <a:avLst/>
+          </a:prstGeom>
+          <a:noFill/>
+        </p:spPr>
+        <p:txBody>
+          <a:bodyPr wrap="square" rtlCol="0">
+            <a:spAutoFit/>
+          </a:bodyPr>
+          <a:lstStyle/>
+          <a:p>
+            <a:r>
+              <a:rPr lang="en-US" sz="1100" b="1" dirty="0"/>
+              <a:t>Human Language attack/threats  scenario description </a:t>
+            </a:r>
+            <a:endParaRPr lang="en-SG" sz="1100" b="1" dirty="0"/>
+          </a:p>
+        </p:txBody>
+      </p:sp>
+      <p:sp>
+        <p:nvSpPr>
+          <p:cNvPr id="75" name="TextBox 74">
+            <a:extLst>
+              <a:ext uri="{FF2B5EF4-FFF2-40B4-BE49-F238E27FC236}">
+                <a16:creationId xmlns:a16="http://schemas.microsoft.com/office/drawing/2014/main" id="{7004DBE0-5DD0-6369-C499-B682F22DFB39}"/>
+              </a:ext>
+            </a:extLst>
+          </p:cNvPr>
+          <p:cNvSpPr txBox="1"/>
+          <p:nvPr/>
+        </p:nvSpPr>
+        <p:spPr>
+          <a:xfrm>
+            <a:off x="1282392" y="1450393"/>
+            <a:ext cx="3445846" cy="307777"/>
+          </a:xfrm>
+          <a:prstGeom prst="rect">
+            <a:avLst/>
+          </a:prstGeom>
+          <a:noFill/>
+          <a:ln w="12700">
+            <a:solidFill>
+              <a:schemeClr val="tx1"/>
+            </a:solidFill>
+            <a:prstDash val="sysDash"/>
+          </a:ln>
+        </p:spPr>
+        <p:txBody>
+          <a:bodyPr wrap="square" rtlCol="0">
+            <a:spAutoFit/>
+          </a:bodyPr>
+          <a:lstStyle/>
+          <a:p>
+            <a:r>
+              <a:rPr lang="en-US" sz="1400" b="1" dirty="0"/>
+              <a:t>Threats To MITRE(CWD, ATT&amp;CK) Mapper</a:t>
+            </a:r>
+            <a:endParaRPr lang="en-SG" sz="1400" b="1" dirty="0"/>
+          </a:p>
+        </p:txBody>
+      </p:sp>
+      <p:pic>
+        <p:nvPicPr>
+          <p:cNvPr id="76" name="Picture 75">
+            <a:extLst>
+              <a:ext uri="{FF2B5EF4-FFF2-40B4-BE49-F238E27FC236}">
+                <a16:creationId xmlns:a16="http://schemas.microsoft.com/office/drawing/2014/main" id="{B9EC441B-FF78-EB5B-F357-C670E68E7D47}"/>
+              </a:ext>
+            </a:extLst>
+          </p:cNvPr>
+          <p:cNvPicPr>
+            <a:picLocks noChangeAspect="1"/>
+          </p:cNvPicPr>
+          <p:nvPr/>
+        </p:nvPicPr>
+        <p:blipFill>
+          <a:blip r:embed="rId5"/>
+          <a:stretch>
+            <a:fillRect/>
+          </a:stretch>
+        </p:blipFill>
+        <p:spPr>
+          <a:xfrm>
+            <a:off x="6261361" y="3505307"/>
+            <a:ext cx="707880" cy="299949"/>
+          </a:xfrm>
+          <a:prstGeom prst="rect">
+            <a:avLst/>
+          </a:prstGeom>
+          <a:ln w="6350">
+            <a:solidFill>
+              <a:schemeClr val="tx1"/>
+            </a:solidFill>
+          </a:ln>
+        </p:spPr>
+      </p:pic>
+      <p:sp>
+        <p:nvSpPr>
+          <p:cNvPr id="77" name="Rectangle 76">
+            <a:extLst>
+              <a:ext uri="{FF2B5EF4-FFF2-40B4-BE49-F238E27FC236}">
+                <a16:creationId xmlns:a16="http://schemas.microsoft.com/office/drawing/2014/main" id="{7AF01517-6F04-D7B1-E4EF-0EA15BAD4588}"/>
+              </a:ext>
+            </a:extLst>
+          </p:cNvPr>
+          <p:cNvSpPr/>
+          <p:nvPr/>
+        </p:nvSpPr>
+        <p:spPr>
+          <a:xfrm>
+            <a:off x="2110154" y="2967115"/>
+            <a:ext cx="4129872" cy="1447057"/>
+          </a:xfrm>
+          <a:prstGeom prst="rect">
+            <a:avLst/>
+          </a:prstGeom>
+          <a:noFill/>
+          <a:ln w="9525">
+            <a:prstDash val="dash"/>
+          </a:ln>
+        </p:spPr>
+        <p:style>
+          <a:lnRef idx="2">
+            <a:schemeClr val="accent1">
+              <a:shade val="15000"/>
+            </a:schemeClr>
+          </a:lnRef>
+          <a:fillRef idx="1">
+            <a:schemeClr val="accent1"/>
+          </a:fillRef>
+          <a:effectRef idx="0">
+            <a:schemeClr val="accent1"/>
+          </a:effectRef>
+          <a:fontRef idx="minor">
+            <a:schemeClr val="lt1"/>
+          </a:fontRef>
+        </p:style>
+        <p:txBody>
+          <a:bodyPr rtlCol="0" anchor="ctr"/>
+          <a:lstStyle/>
+          <a:p>
+            <a:pPr algn="ctr"/>
+            <a:endParaRPr lang="en-SG" dirty="0"/>
+          </a:p>
+        </p:txBody>
+      </p:sp>
+      <p:pic>
+        <p:nvPicPr>
+          <p:cNvPr id="78" name="Picture 77">
+            <a:extLst>
+              <a:ext uri="{FF2B5EF4-FFF2-40B4-BE49-F238E27FC236}">
+                <a16:creationId xmlns:a16="http://schemas.microsoft.com/office/drawing/2014/main" id="{F880B313-32B8-9C6A-46C4-ED40855CDD04}"/>
+              </a:ext>
+            </a:extLst>
+          </p:cNvPr>
+          <p:cNvPicPr>
+            <a:picLocks noChangeAspect="1"/>
+          </p:cNvPicPr>
+          <p:nvPr/>
+        </p:nvPicPr>
+        <p:blipFill>
+          <a:blip r:embed="rId6"/>
+          <a:stretch>
+            <a:fillRect/>
+          </a:stretch>
+        </p:blipFill>
+        <p:spPr>
+          <a:xfrm>
+            <a:off x="3287714" y="5162659"/>
+            <a:ext cx="251129" cy="266716"/>
+          </a:xfrm>
+          <a:prstGeom prst="rect">
+            <a:avLst/>
+          </a:prstGeom>
+          <a:ln w="9525">
+            <a:solidFill>
+              <a:schemeClr val="tx1"/>
+            </a:solidFill>
+          </a:ln>
+        </p:spPr>
+      </p:pic>
+      <p:sp>
+        <p:nvSpPr>
+          <p:cNvPr id="79" name="TextBox 78">
+            <a:extLst>
+              <a:ext uri="{FF2B5EF4-FFF2-40B4-BE49-F238E27FC236}">
+                <a16:creationId xmlns:a16="http://schemas.microsoft.com/office/drawing/2014/main" id="{8C952CD6-040B-DACC-2289-6BC4FD673B7F}"/>
+              </a:ext>
+            </a:extLst>
+          </p:cNvPr>
+          <p:cNvSpPr txBox="1"/>
+          <p:nvPr/>
+        </p:nvSpPr>
+        <p:spPr>
+          <a:xfrm>
+            <a:off x="3483992" y="5179114"/>
+            <a:ext cx="1417551" cy="261610"/>
+          </a:xfrm>
+          <a:prstGeom prst="rect">
+            <a:avLst/>
+          </a:prstGeom>
+          <a:noFill/>
+        </p:spPr>
+        <p:txBody>
+          <a:bodyPr wrap="square" rtlCol="0">
+            <a:spAutoFit/>
+          </a:bodyPr>
+          <a:lstStyle/>
+          <a:p>
+            <a:r>
+              <a:rPr lang="en-US" sz="1100" b="1" dirty="0">
+                <a:solidFill>
+                  <a:schemeClr val="accent6">
+                    <a:lumMod val="50000"/>
+                  </a:schemeClr>
+                </a:solidFill>
+              </a:rPr>
+              <a:t>GPT-3.5 Turbo</a:t>
+            </a:r>
+            <a:endParaRPr lang="en-SG" sz="1100" b="1" dirty="0">
+              <a:solidFill>
+                <a:schemeClr val="accent6">
+                  <a:lumMod val="50000"/>
+                </a:schemeClr>
+              </a:solidFill>
+            </a:endParaRPr>
+          </a:p>
+        </p:txBody>
+      </p:sp>
+      <p:pic>
+        <p:nvPicPr>
+          <p:cNvPr id="81" name="Picture 80">
+            <a:extLst>
+              <a:ext uri="{FF2B5EF4-FFF2-40B4-BE49-F238E27FC236}">
+                <a16:creationId xmlns:a16="http://schemas.microsoft.com/office/drawing/2014/main" id="{3A7FE086-7B95-4F41-A554-68B4EE106778}"/>
+              </a:ext>
+            </a:extLst>
+          </p:cNvPr>
+          <p:cNvPicPr>
+            <a:picLocks noChangeAspect="1"/>
+          </p:cNvPicPr>
+          <p:nvPr/>
+        </p:nvPicPr>
+        <p:blipFill>
+          <a:blip r:embed="rId7"/>
+          <a:stretch>
+            <a:fillRect/>
+          </a:stretch>
+        </p:blipFill>
+        <p:spPr>
+          <a:xfrm>
+            <a:off x="6390752" y="2612424"/>
+            <a:ext cx="1361090" cy="296730"/>
+          </a:xfrm>
+          <a:prstGeom prst="rect">
+            <a:avLst/>
+          </a:prstGeom>
+          <a:ln w="12700">
+            <a:solidFill>
+              <a:schemeClr val="tx1"/>
+            </a:solidFill>
+          </a:ln>
+        </p:spPr>
+      </p:pic>
+      <p:cxnSp>
+        <p:nvCxnSpPr>
+          <p:cNvPr id="83" name="Connector: Elbow 82">
+            <a:extLst>
+              <a:ext uri="{FF2B5EF4-FFF2-40B4-BE49-F238E27FC236}">
+                <a16:creationId xmlns:a16="http://schemas.microsoft.com/office/drawing/2014/main" id="{590AAC6F-9FF4-3383-E72E-13DB9A48912D}"/>
+              </a:ext>
+            </a:extLst>
+          </p:cNvPr>
+          <p:cNvCxnSpPr>
+            <a:cxnSpLocks/>
+            <a:stCxn id="81" idx="1"/>
+            <a:endCxn id="77" idx="0"/>
+          </p:cNvCxnSpPr>
+          <p:nvPr/>
+        </p:nvCxnSpPr>
+        <p:spPr>
+          <a:xfrm rot="10800000" flipV="1">
+            <a:off x="4175090" y="2760789"/>
+            <a:ext cx="2215662" cy="206326"/>
+          </a:xfrm>
+          <a:prstGeom prst="bentConnector2">
+            <a:avLst/>
+          </a:prstGeom>
+          <a:ln>
+            <a:solidFill>
+              <a:schemeClr val="bg1">
+                <a:lumMod val="50000"/>
+              </a:schemeClr>
+            </a:solidFill>
+            <a:prstDash val="sysDash"/>
+            <a:tailEnd type="triangle"/>
+          </a:ln>
+        </p:spPr>
+        <p:style>
+          <a:lnRef idx="2">
+            <a:schemeClr val="accent1"/>
+          </a:lnRef>
+          <a:fillRef idx="0">
+            <a:schemeClr val="accent1"/>
+          </a:fillRef>
+          <a:effectRef idx="1">
+            <a:schemeClr val="accent1"/>
+          </a:effectRef>
+          <a:fontRef idx="minor">
+            <a:schemeClr val="tx1"/>
+          </a:fontRef>
+        </p:style>
+      </p:cxnSp>
+      <p:sp>
+        <p:nvSpPr>
+          <p:cNvPr id="95" name="TextBox 94">
+            <a:extLst>
+              <a:ext uri="{FF2B5EF4-FFF2-40B4-BE49-F238E27FC236}">
+                <a16:creationId xmlns:a16="http://schemas.microsoft.com/office/drawing/2014/main" id="{86167747-85A5-CF15-68C3-BDC7BE164870}"/>
+              </a:ext>
+            </a:extLst>
+          </p:cNvPr>
+          <p:cNvSpPr txBox="1"/>
+          <p:nvPr/>
+        </p:nvSpPr>
+        <p:spPr>
+          <a:xfrm>
+            <a:off x="6314023" y="2895015"/>
+            <a:ext cx="2088558" cy="430887"/>
+          </a:xfrm>
+          <a:prstGeom prst="rect">
+            <a:avLst/>
+          </a:prstGeom>
+          <a:noFill/>
+        </p:spPr>
+        <p:txBody>
+          <a:bodyPr wrap="square" rtlCol="0">
+            <a:spAutoFit/>
+          </a:bodyPr>
+          <a:lstStyle/>
+          <a:p>
+            <a:r>
+              <a:rPr lang="en-US" sz="1100" b="1" dirty="0">
+                <a:solidFill>
+                  <a:schemeClr val="bg1">
+                    <a:lumMod val="50000"/>
+                  </a:schemeClr>
+                </a:solidFill>
+              </a:rPr>
+              <a:t>LLM conversation chain framework </a:t>
+            </a:r>
+            <a:endParaRPr lang="en-SG" sz="1100" b="1" dirty="0">
+              <a:solidFill>
+                <a:schemeClr val="bg1">
+                  <a:lumMod val="50000"/>
+                </a:schemeClr>
+              </a:solidFill>
+            </a:endParaRPr>
+          </a:p>
+        </p:txBody>
+      </p:sp>
+      <p:pic>
+        <p:nvPicPr>
+          <p:cNvPr id="96" name="Picture 95">
+            <a:extLst>
+              <a:ext uri="{FF2B5EF4-FFF2-40B4-BE49-F238E27FC236}">
+                <a16:creationId xmlns:a16="http://schemas.microsoft.com/office/drawing/2014/main" id="{8C7C3C8F-CB37-D106-1ED5-D7B07775FD9D}"/>
+              </a:ext>
+            </a:extLst>
+          </p:cNvPr>
+          <p:cNvPicPr>
+            <a:picLocks noChangeAspect="1"/>
+          </p:cNvPicPr>
+          <p:nvPr/>
+        </p:nvPicPr>
+        <p:blipFill>
+          <a:blip r:embed="rId8"/>
+          <a:stretch>
+            <a:fillRect/>
+          </a:stretch>
+        </p:blipFill>
+        <p:spPr>
+          <a:xfrm>
+            <a:off x="7290701" y="2137693"/>
+            <a:ext cx="393540" cy="313634"/>
+          </a:xfrm>
+          <a:prstGeom prst="rect">
+            <a:avLst/>
+          </a:prstGeom>
+          <a:ln>
+            <a:solidFill>
+              <a:schemeClr val="tx2">
+                <a:lumMod val="75000"/>
+                <a:lumOff val="25000"/>
+              </a:schemeClr>
+            </a:solidFill>
+          </a:ln>
+        </p:spPr>
+      </p:pic>
+      <p:sp>
+        <p:nvSpPr>
+          <p:cNvPr id="97" name="TextBox 96">
+            <a:extLst>
+              <a:ext uri="{FF2B5EF4-FFF2-40B4-BE49-F238E27FC236}">
+                <a16:creationId xmlns:a16="http://schemas.microsoft.com/office/drawing/2014/main" id="{4282BDC6-2D5A-EAE8-B788-D28728D0D6DD}"/>
+              </a:ext>
+            </a:extLst>
+          </p:cNvPr>
+          <p:cNvSpPr txBox="1"/>
+          <p:nvPr/>
+        </p:nvSpPr>
+        <p:spPr>
+          <a:xfrm>
+            <a:off x="6924012" y="1698743"/>
+            <a:ext cx="2088558" cy="430887"/>
+          </a:xfrm>
+          <a:prstGeom prst="rect">
+            <a:avLst/>
+          </a:prstGeom>
+          <a:noFill/>
+        </p:spPr>
+        <p:txBody>
+          <a:bodyPr wrap="square" rtlCol="0">
+            <a:spAutoFit/>
+          </a:bodyPr>
+          <a:lstStyle/>
+          <a:p>
+            <a:r>
+              <a:rPr lang="en-US" sz="1100" b="1" dirty="0">
+                <a:solidFill>
+                  <a:schemeClr val="bg1">
+                    <a:lumMod val="50000"/>
+                  </a:schemeClr>
+                </a:solidFill>
+              </a:rPr>
+              <a:t>MITRE Background Knowledge prompt</a:t>
+            </a:r>
+            <a:endParaRPr lang="en-SG" sz="1100" b="1" dirty="0">
+              <a:solidFill>
+                <a:schemeClr val="bg1">
+                  <a:lumMod val="50000"/>
+                </a:schemeClr>
+              </a:solidFill>
+            </a:endParaRPr>
+          </a:p>
+        </p:txBody>
+      </p:sp>
+      <p:cxnSp>
+        <p:nvCxnSpPr>
+          <p:cNvPr id="98" name="Connector: Elbow 97">
+            <a:extLst>
+              <a:ext uri="{FF2B5EF4-FFF2-40B4-BE49-F238E27FC236}">
+                <a16:creationId xmlns:a16="http://schemas.microsoft.com/office/drawing/2014/main" id="{817EE48F-10BB-77BB-28F7-05BD5C03E0F5}"/>
+              </a:ext>
+            </a:extLst>
+          </p:cNvPr>
+          <p:cNvCxnSpPr>
+            <a:cxnSpLocks/>
+            <a:stCxn id="96" idx="1"/>
+            <a:endCxn id="81" idx="0"/>
+          </p:cNvCxnSpPr>
+          <p:nvPr/>
+        </p:nvCxnSpPr>
+        <p:spPr>
+          <a:xfrm rot="10800000" flipV="1">
+            <a:off x="7071297" y="2294510"/>
+            <a:ext cx="219404" cy="317914"/>
+          </a:xfrm>
+          <a:prstGeom prst="bentConnector2">
+            <a:avLst/>
+          </a:prstGeom>
+          <a:ln>
+            <a:solidFill>
+              <a:schemeClr val="bg1">
+                <a:lumMod val="50000"/>
+              </a:schemeClr>
+            </a:solidFill>
+            <a:prstDash val="sysDash"/>
+            <a:tailEnd type="triangle"/>
+          </a:ln>
+        </p:spPr>
+        <p:style>
+          <a:lnRef idx="2">
+            <a:schemeClr val="accent1"/>
+          </a:lnRef>
+          <a:fillRef idx="0">
+            <a:schemeClr val="accent1"/>
+          </a:fillRef>
+          <a:effectRef idx="1">
+            <a:schemeClr val="accent1"/>
+          </a:effectRef>
+          <a:fontRef idx="minor">
+            <a:schemeClr val="tx1"/>
+          </a:fontRef>
+        </p:style>
+      </p:cxnSp>
+    </p:spTree>
+    <p:extLst>
+      <p:ext uri="{BB962C8B-B14F-4D97-AF65-F5344CB8AC3E}">
+        <p14:creationId xmlns:p14="http://schemas.microsoft.com/office/powerpoint/2010/main" val="217297661"/>
+      </p:ext>
+    </p:extLst>
+  </p:cSld>
+  <p:clrMapOvr>
+    <a:masterClrMapping/>
+  </p:clrMapOvr>
+</p:sld>
+</file>
+
+<file path=ppt/slides/slide3.xml><?xml version="1.0" encoding="utf-8"?>
+<p:sld xmlns:a="http://schemas.openxmlformats.org/drawingml/2006/main" xmlns:r="http://schemas.openxmlformats.org/officeDocument/2006/relationships" xmlns:p="http://schemas.openxmlformats.org/presentationml/2006/main">
+  <p:cSld>
+    <p:spTree>
+      <p:nvGrpSpPr>
         <p:cNvPr id="1" name="">
           <a:extLst>
             <a:ext uri="{FF2B5EF4-FFF2-40B4-BE49-F238E27FC236}">
@@ -6428,7 +8246,7 @@
                 </a:solidFill>
                 <a:effectLst/>
               </a:rPr>
-              <a:t>Structured Threat Information Expression (STIX) Attack flow report</a:t>
+              <a:t>Structured Threat Information Expression (STIX) attack flow report</a:t>
             </a:r>
             <a:endParaRPr lang="en-SG" sz="1100" b="1" dirty="0"/>
           </a:p>
@@ -6464,7 +8282,7 @@
           <a:p>
             <a:r>
               <a:rPr lang="en-US" sz="1100" b="1" dirty="0"/>
-              <a:t>Human Language attack/thread scenario description </a:t>
+              <a:t>Human Language attack/threats scenario description </a:t>
             </a:r>
             <a:endParaRPr lang="en-SG" sz="1100" b="1" dirty="0"/>
           </a:p>
@@ -6532,7 +8350,7 @@
             <a:avLst/>
           </a:prstGeom>
           <a:solidFill>
-            <a:schemeClr val="accent2">
+            <a:schemeClr val="accent6">
               <a:lumMod val="40000"/>
               <a:lumOff val="60000"/>
             </a:schemeClr>
@@ -6565,7 +8383,7 @@
                   <a:schemeClr val="tx1"/>
                 </a:solidFill>
               </a:rPr>
-              <a:t>LLM Attack Scenario analyzer</a:t>
+              <a:t>LLM Attack Scenario Analyzer</a:t>
             </a:r>
             <a:endParaRPr lang="en-SG" sz="1200" b="1" dirty="0">
               <a:solidFill>
@@ -6814,8 +8632,8 @@
         </p:nvSpPr>
         <p:spPr>
           <a:xfrm>
-            <a:off x="3292349" y="2631236"/>
-            <a:ext cx="1233191" cy="938719"/>
+            <a:off x="3281193" y="2609237"/>
+            <a:ext cx="1186112" cy="1107996"/>
           </a:xfrm>
           <a:prstGeom prst="rect">
             <a:avLst/>
@@ -6830,13 +8648,7 @@
           <a:p>
             <a:r>
               <a:rPr lang="en-US" sz="1100" b="1" dirty="0"/>
-              <a:t>Text format summary of the </a:t>
-            </a:r>
-          </a:p>
-          <a:p>
-            <a:r>
-              <a:rPr lang="en-US" sz="1100" b="1" dirty="0"/>
-              <a:t>Attack flow path in the attack scenario </a:t>
+              <a:t>Text format summary of the attack flow path in the threats attack scenario </a:t>
             </a:r>
             <a:endParaRPr lang="en-SG" sz="1100" b="1" dirty="0"/>
           </a:p>
@@ -7150,7 +8962,7 @@
         </p:nvSpPr>
         <p:spPr>
           <a:xfrm>
-            <a:off x="5574890" y="4428806"/>
+            <a:off x="5574890" y="4408710"/>
             <a:ext cx="475529" cy="400110"/>
           </a:xfrm>
           <a:prstGeom prst="rect">
@@ -11000,7 +12812,7 @@
 </p:sld>
 </file>
 
-<file path=ppt/slides/slide3.xml><?xml version="1.0" encoding="utf-8"?>
+<file path=ppt/slides/slide4.xml><?xml version="1.0" encoding="utf-8"?>
 <p:sld xmlns:a="http://schemas.openxmlformats.org/drawingml/2006/main" xmlns:r="http://schemas.openxmlformats.org/officeDocument/2006/relationships" xmlns:p="http://schemas.openxmlformats.org/presentationml/2006/main">
   <p:cSld>
     <p:spTree>

</xml_diff>

<commit_message>
update the introduction page.
</commit_message>
<xml_diff>
--- a/doc/designDoc.pptx
+++ b/doc/designDoc.pptx
@@ -266,7 +266,7 @@
           <a:p>
             <a:fld id="{478FE37C-4760-4CCB-A8C8-82BFD3D78224}" type="datetimeFigureOut">
               <a:rPr lang="en-SG" smtClean="0"/>
-              <a:t>3/3/2024</a:t>
+              <a:t>5/3/2024</a:t>
             </a:fld>
             <a:endParaRPr lang="en-SG"/>
           </a:p>
@@ -466,7 +466,7 @@
           <a:p>
             <a:fld id="{478FE37C-4760-4CCB-A8C8-82BFD3D78224}" type="datetimeFigureOut">
               <a:rPr lang="en-SG" smtClean="0"/>
-              <a:t>3/3/2024</a:t>
+              <a:t>5/3/2024</a:t>
             </a:fld>
             <a:endParaRPr lang="en-SG"/>
           </a:p>
@@ -676,7 +676,7 @@
           <a:p>
             <a:fld id="{478FE37C-4760-4CCB-A8C8-82BFD3D78224}" type="datetimeFigureOut">
               <a:rPr lang="en-SG" smtClean="0"/>
-              <a:t>3/3/2024</a:t>
+              <a:t>5/3/2024</a:t>
             </a:fld>
             <a:endParaRPr lang="en-SG"/>
           </a:p>
@@ -876,7 +876,7 @@
           <a:p>
             <a:fld id="{478FE37C-4760-4CCB-A8C8-82BFD3D78224}" type="datetimeFigureOut">
               <a:rPr lang="en-SG" smtClean="0"/>
-              <a:t>3/3/2024</a:t>
+              <a:t>5/3/2024</a:t>
             </a:fld>
             <a:endParaRPr lang="en-SG"/>
           </a:p>
@@ -1152,7 +1152,7 @@
           <a:p>
             <a:fld id="{478FE37C-4760-4CCB-A8C8-82BFD3D78224}" type="datetimeFigureOut">
               <a:rPr lang="en-SG" smtClean="0"/>
-              <a:t>3/3/2024</a:t>
+              <a:t>5/3/2024</a:t>
             </a:fld>
             <a:endParaRPr lang="en-SG"/>
           </a:p>
@@ -1420,7 +1420,7 @@
           <a:p>
             <a:fld id="{478FE37C-4760-4CCB-A8C8-82BFD3D78224}" type="datetimeFigureOut">
               <a:rPr lang="en-SG" smtClean="0"/>
-              <a:t>3/3/2024</a:t>
+              <a:t>5/3/2024</a:t>
             </a:fld>
             <a:endParaRPr lang="en-SG"/>
           </a:p>
@@ -1835,7 +1835,7 @@
           <a:p>
             <a:fld id="{478FE37C-4760-4CCB-A8C8-82BFD3D78224}" type="datetimeFigureOut">
               <a:rPr lang="en-SG" smtClean="0"/>
-              <a:t>3/3/2024</a:t>
+              <a:t>5/3/2024</a:t>
             </a:fld>
             <a:endParaRPr lang="en-SG"/>
           </a:p>
@@ -1977,7 +1977,7 @@
           <a:p>
             <a:fld id="{478FE37C-4760-4CCB-A8C8-82BFD3D78224}" type="datetimeFigureOut">
               <a:rPr lang="en-SG" smtClean="0"/>
-              <a:t>3/3/2024</a:t>
+              <a:t>5/3/2024</a:t>
             </a:fld>
             <a:endParaRPr lang="en-SG"/>
           </a:p>
@@ -2090,7 +2090,7 @@
           <a:p>
             <a:fld id="{478FE37C-4760-4CCB-A8C8-82BFD3D78224}" type="datetimeFigureOut">
               <a:rPr lang="en-SG" smtClean="0"/>
-              <a:t>3/3/2024</a:t>
+              <a:t>5/3/2024</a:t>
             </a:fld>
             <a:endParaRPr lang="en-SG"/>
           </a:p>
@@ -2403,7 +2403,7 @@
           <a:p>
             <a:fld id="{478FE37C-4760-4CCB-A8C8-82BFD3D78224}" type="datetimeFigureOut">
               <a:rPr lang="en-SG" smtClean="0"/>
-              <a:t>3/3/2024</a:t>
+              <a:t>5/3/2024</a:t>
             </a:fld>
             <a:endParaRPr lang="en-SG"/>
           </a:p>
@@ -2692,7 +2692,7 @@
           <a:p>
             <a:fld id="{478FE37C-4760-4CCB-A8C8-82BFD3D78224}" type="datetimeFigureOut">
               <a:rPr lang="en-SG" smtClean="0"/>
-              <a:t>3/3/2024</a:t>
+              <a:t>5/3/2024</a:t>
             </a:fld>
             <a:endParaRPr lang="en-SG"/>
           </a:p>
@@ -2935,7 +2935,7 @@
           <a:p>
             <a:fld id="{478FE37C-4760-4CCB-A8C8-82BFD3D78224}" type="datetimeFigureOut">
               <a:rPr lang="en-SG" smtClean="0"/>
-              <a:t>3/3/2024</a:t>
+              <a:t>5/3/2024</a:t>
             </a:fld>
             <a:endParaRPr lang="en-SG"/>
           </a:p>

</xml_diff>

<commit_message>
update the design document and the read me file.
</commit_message>
<xml_diff>
--- a/doc/designDoc.pptx
+++ b/doc/designDoc.pptx
@@ -11,6 +11,10 @@
     <p:sldId id="257" r:id="rId5"/>
     <p:sldId id="260" r:id="rId6"/>
     <p:sldId id="261" r:id="rId7"/>
+    <p:sldId id="263" r:id="rId8"/>
+    <p:sldId id="264" r:id="rId9"/>
+    <p:sldId id="265" r:id="rId10"/>
+    <p:sldId id="262" r:id="rId11"/>
   </p:sldIdLst>
   <p:sldSz cx="12192000" cy="6858000"/>
   <p:notesSz cx="6858000" cy="9144000"/>
@@ -6128,6 +6132,229 @@
 </p:sld>
 </file>
 
+<file path=ppt/slides/slide10.xml><?xml version="1.0" encoding="utf-8"?>
+<p:sld xmlns:a="http://schemas.openxmlformats.org/drawingml/2006/main" xmlns:r="http://schemas.openxmlformats.org/officeDocument/2006/relationships" xmlns:p="http://schemas.openxmlformats.org/presentationml/2006/main">
+  <p:cSld>
+    <p:spTree>
+      <p:nvGrpSpPr>
+        <p:cNvPr id="1" name=""/>
+        <p:cNvGrpSpPr/>
+        <p:nvPr/>
+      </p:nvGrpSpPr>
+      <p:grpSpPr>
+        <a:xfrm>
+          <a:off x="0" y="0"/>
+          <a:ext cx="0" cy="0"/>
+          <a:chOff x="0" y="0"/>
+          <a:chExt cx="0" cy="0"/>
+        </a:xfrm>
+      </p:grpSpPr>
+      <p:sp>
+        <p:nvSpPr>
+          <p:cNvPr id="14" name="Rectangle 13">
+            <a:extLst>
+              <a:ext uri="{FF2B5EF4-FFF2-40B4-BE49-F238E27FC236}">
+                <a16:creationId xmlns:a16="http://schemas.microsoft.com/office/drawing/2014/main" id="{B6364A6B-6ACF-2B22-6F55-957ABD8791B3}"/>
+              </a:ext>
+            </a:extLst>
+          </p:cNvPr>
+          <p:cNvSpPr/>
+          <p:nvPr/>
+        </p:nvSpPr>
+        <p:spPr>
+          <a:xfrm>
+            <a:off x="667512" y="374904"/>
+            <a:ext cx="10277856" cy="5994404"/>
+          </a:xfrm>
+          <a:prstGeom prst="rect">
+            <a:avLst/>
+          </a:prstGeom>
+        </p:spPr>
+        <p:style>
+          <a:lnRef idx="2">
+            <a:schemeClr val="accent1">
+              <a:shade val="15000"/>
+            </a:schemeClr>
+          </a:lnRef>
+          <a:fillRef idx="1">
+            <a:schemeClr val="accent1"/>
+          </a:fillRef>
+          <a:effectRef idx="0">
+            <a:schemeClr val="accent1"/>
+          </a:effectRef>
+          <a:fontRef idx="minor">
+            <a:schemeClr val="lt1"/>
+          </a:fontRef>
+        </p:style>
+        <p:txBody>
+          <a:bodyPr rtlCol="0" anchor="ctr"/>
+          <a:lstStyle/>
+          <a:p>
+            <a:pPr algn="ctr"/>
+            <a:endParaRPr lang="en-SG"/>
+          </a:p>
+        </p:txBody>
+      </p:sp>
+      <p:pic>
+        <p:nvPicPr>
+          <p:cNvPr id="7" name="Picture 6" descr="A diagram of a system&#10;&#10;Description automatically generated">
+            <a:extLst>
+              <a:ext uri="{FF2B5EF4-FFF2-40B4-BE49-F238E27FC236}">
+                <a16:creationId xmlns:a16="http://schemas.microsoft.com/office/drawing/2014/main" id="{C3795B0C-DE6A-0BF0-4CCE-F957EB9A2597}"/>
+              </a:ext>
+            </a:extLst>
+          </p:cNvPr>
+          <p:cNvPicPr>
+            <a:picLocks noChangeAspect="1"/>
+          </p:cNvPicPr>
+          <p:nvPr/>
+        </p:nvPicPr>
+        <p:blipFill>
+          <a:blip r:embed="rId2">
+            <a:extLst>
+              <a:ext uri="{28A0092B-C50C-407E-A947-70E740481C1C}">
+                <a14:useLocalDpi xmlns:a14="http://schemas.microsoft.com/office/drawing/2010/main" val="0"/>
+              </a:ext>
+            </a:extLst>
+          </a:blip>
+          <a:stretch>
+            <a:fillRect/>
+          </a:stretch>
+        </p:blipFill>
+        <p:spPr>
+          <a:xfrm>
+            <a:off x="782753" y="488691"/>
+            <a:ext cx="5219716" cy="3151404"/>
+          </a:xfrm>
+          <a:prstGeom prst="rect">
+            <a:avLst/>
+          </a:prstGeom>
+          <a:ln w="9525">
+            <a:solidFill>
+              <a:schemeClr val="tx1"/>
+            </a:solidFill>
+          </a:ln>
+        </p:spPr>
+      </p:pic>
+      <p:pic>
+        <p:nvPicPr>
+          <p:cNvPr id="9" name="Picture 8" descr="A screenshot of a computer&#10;&#10;Description automatically generated">
+            <a:extLst>
+              <a:ext uri="{FF2B5EF4-FFF2-40B4-BE49-F238E27FC236}">
+                <a16:creationId xmlns:a16="http://schemas.microsoft.com/office/drawing/2014/main" id="{ED8EA84D-5C60-421D-1F7E-3E9CA33CD527}"/>
+              </a:ext>
+            </a:extLst>
+          </p:cNvPr>
+          <p:cNvPicPr>
+            <a:picLocks noChangeAspect="1"/>
+          </p:cNvPicPr>
+          <p:nvPr/>
+        </p:nvPicPr>
+        <p:blipFill>
+          <a:blip r:embed="rId3">
+            <a:extLst>
+              <a:ext uri="{28A0092B-C50C-407E-A947-70E740481C1C}">
+                <a14:useLocalDpi xmlns:a14="http://schemas.microsoft.com/office/drawing/2010/main" val="0"/>
+              </a:ext>
+            </a:extLst>
+          </a:blip>
+          <a:stretch>
+            <a:fillRect/>
+          </a:stretch>
+        </p:blipFill>
+        <p:spPr>
+          <a:xfrm>
+            <a:off x="6002468" y="488692"/>
+            <a:ext cx="4833440" cy="3151403"/>
+          </a:xfrm>
+          <a:prstGeom prst="rect">
+            <a:avLst/>
+          </a:prstGeom>
+        </p:spPr>
+      </p:pic>
+      <p:pic>
+        <p:nvPicPr>
+          <p:cNvPr id="11" name="Picture 10" descr="A screenshot of a computer&#10;&#10;Description automatically generated">
+            <a:extLst>
+              <a:ext uri="{FF2B5EF4-FFF2-40B4-BE49-F238E27FC236}">
+                <a16:creationId xmlns:a16="http://schemas.microsoft.com/office/drawing/2014/main" id="{871E5F22-1A3D-6731-FBEC-20B230EE2256}"/>
+              </a:ext>
+            </a:extLst>
+          </p:cNvPr>
+          <p:cNvPicPr>
+            <a:picLocks noChangeAspect="1"/>
+          </p:cNvPicPr>
+          <p:nvPr/>
+        </p:nvPicPr>
+        <p:blipFill rotWithShape="1">
+          <a:blip r:embed="rId4">
+            <a:extLst>
+              <a:ext uri="{28A0092B-C50C-407E-A947-70E740481C1C}">
+                <a14:useLocalDpi xmlns:a14="http://schemas.microsoft.com/office/drawing/2010/main" val="0"/>
+              </a:ext>
+            </a:extLst>
+          </a:blip>
+          <a:srcRect b="17805"/>
+          <a:stretch/>
+        </p:blipFill>
+        <p:spPr>
+          <a:xfrm>
+            <a:off x="782754" y="3640095"/>
+            <a:ext cx="4935439" cy="2644938"/>
+          </a:xfrm>
+          <a:prstGeom prst="rect">
+            <a:avLst/>
+          </a:prstGeom>
+        </p:spPr>
+      </p:pic>
+      <p:pic>
+        <p:nvPicPr>
+          <p:cNvPr id="13" name="Picture 12" descr="A screenshot of a computer&#10;&#10;Description automatically generated">
+            <a:extLst>
+              <a:ext uri="{FF2B5EF4-FFF2-40B4-BE49-F238E27FC236}">
+                <a16:creationId xmlns:a16="http://schemas.microsoft.com/office/drawing/2014/main" id="{E7BCD531-9110-D9DA-EBDE-EAA9C31B94D7}"/>
+              </a:ext>
+            </a:extLst>
+          </p:cNvPr>
+          <p:cNvPicPr>
+            <a:picLocks noChangeAspect="1"/>
+          </p:cNvPicPr>
+          <p:nvPr/>
+        </p:nvPicPr>
+        <p:blipFill rotWithShape="1">
+          <a:blip r:embed="rId5">
+            <a:extLst>
+              <a:ext uri="{28A0092B-C50C-407E-A947-70E740481C1C}">
+                <a14:useLocalDpi xmlns:a14="http://schemas.microsoft.com/office/drawing/2010/main" val="0"/>
+              </a:ext>
+            </a:extLst>
+          </a:blip>
+          <a:srcRect b="20516"/>
+          <a:stretch/>
+        </p:blipFill>
+        <p:spPr>
+          <a:xfrm>
+            <a:off x="5716511" y="3640096"/>
+            <a:ext cx="5103733" cy="2644938"/>
+          </a:xfrm>
+          <a:prstGeom prst="rect">
+            <a:avLst/>
+          </a:prstGeom>
+        </p:spPr>
+      </p:pic>
+    </p:spTree>
+    <p:extLst>
+      <p:ext uri="{BB962C8B-B14F-4D97-AF65-F5344CB8AC3E}">
+        <p14:creationId xmlns:p14="http://schemas.microsoft.com/office/powerpoint/2010/main" val="3673846034"/>
+      </p:ext>
+    </p:extLst>
+  </p:cSld>
+  <p:clrMapOvr>
+    <a:masterClrMapping/>
+  </p:clrMapOvr>
+</p:sld>
+</file>
+
 <file path=ppt/slides/slide2.xml><?xml version="1.0" encoding="utf-8"?>
 <p:sld xmlns:a="http://schemas.openxmlformats.org/drawingml/2006/main" xmlns:r="http://schemas.openxmlformats.org/officeDocument/2006/relationships" xmlns:p="http://schemas.openxmlformats.org/presentationml/2006/main">
   <p:cSld>
@@ -17786,10 +18013,307 @@
       </p:grpSpPr>
       <p:pic>
         <p:nvPicPr>
+          <p:cNvPr id="3" name="Picture 2">
+            <a:extLst>
+              <a:ext uri="{FF2B5EF4-FFF2-40B4-BE49-F238E27FC236}">
+                <a16:creationId xmlns:a16="http://schemas.microsoft.com/office/drawing/2014/main" id="{A4C046D5-035E-46BB-2899-CFFB5A683CDF}"/>
+              </a:ext>
+            </a:extLst>
+          </p:cNvPr>
+          <p:cNvPicPr>
+            <a:picLocks noChangeAspect="1"/>
+          </p:cNvPicPr>
+          <p:nvPr/>
+        </p:nvPicPr>
+        <p:blipFill rotWithShape="1">
+          <a:blip r:embed="rId2"/>
+          <a:srcRect b="7407"/>
+          <a:stretch/>
+        </p:blipFill>
+        <p:spPr>
+          <a:xfrm>
+            <a:off x="1014055" y="457210"/>
+            <a:ext cx="9523809" cy="5943580"/>
+          </a:xfrm>
+          <a:prstGeom prst="rect">
+            <a:avLst/>
+          </a:prstGeom>
+        </p:spPr>
+      </p:pic>
+      <p:sp>
+        <p:nvSpPr>
+          <p:cNvPr id="7" name="Rectangle 6">
+            <a:extLst>
+              <a:ext uri="{FF2B5EF4-FFF2-40B4-BE49-F238E27FC236}">
+                <a16:creationId xmlns:a16="http://schemas.microsoft.com/office/drawing/2014/main" id="{E987D324-D185-6D81-D296-E26A31AB942F}"/>
+              </a:ext>
+            </a:extLst>
+          </p:cNvPr>
+          <p:cNvSpPr/>
+          <p:nvPr/>
+        </p:nvSpPr>
+        <p:spPr>
+          <a:xfrm>
+            <a:off x="4026877" y="3108960"/>
+            <a:ext cx="3654083" cy="836324"/>
+          </a:xfrm>
+          <a:prstGeom prst="rect">
+            <a:avLst/>
+          </a:prstGeom>
+          <a:noFill/>
+          <a:ln w="19050">
+            <a:solidFill>
+              <a:srgbClr val="FF0000"/>
+            </a:solidFill>
+            <a:prstDash val="sysDash"/>
+          </a:ln>
+        </p:spPr>
+        <p:style>
+          <a:lnRef idx="2">
+            <a:schemeClr val="accent1">
+              <a:shade val="15000"/>
+            </a:schemeClr>
+          </a:lnRef>
+          <a:fillRef idx="1">
+            <a:schemeClr val="accent1"/>
+          </a:fillRef>
+          <a:effectRef idx="0">
+            <a:schemeClr val="accent1"/>
+          </a:effectRef>
+          <a:fontRef idx="minor">
+            <a:schemeClr val="lt1"/>
+          </a:fontRef>
+        </p:style>
+        <p:txBody>
+          <a:bodyPr rtlCol="0" anchor="ctr"/>
+          <a:lstStyle/>
+          <a:p>
+            <a:pPr algn="ctr"/>
+            <a:endParaRPr lang="en-SG"/>
+          </a:p>
+        </p:txBody>
+      </p:sp>
+      <p:sp>
+        <p:nvSpPr>
+          <p:cNvPr id="13" name="Rectangle 12">
+            <a:extLst>
+              <a:ext uri="{FF2B5EF4-FFF2-40B4-BE49-F238E27FC236}">
+                <a16:creationId xmlns:a16="http://schemas.microsoft.com/office/drawing/2014/main" id="{EA2C5DBB-DC81-EA4A-3CF0-47B48E5E798E}"/>
+              </a:ext>
+            </a:extLst>
+          </p:cNvPr>
+          <p:cNvSpPr/>
+          <p:nvPr/>
+        </p:nvSpPr>
+        <p:spPr>
+          <a:xfrm>
+            <a:off x="2670784" y="4133089"/>
+            <a:ext cx="6500647" cy="649224"/>
+          </a:xfrm>
+          <a:prstGeom prst="rect">
+            <a:avLst/>
+          </a:prstGeom>
+          <a:noFill/>
+          <a:ln w="19050">
+            <a:solidFill>
+              <a:srgbClr val="FF0000"/>
+            </a:solidFill>
+            <a:prstDash val="sysDash"/>
+          </a:ln>
+        </p:spPr>
+        <p:style>
+          <a:lnRef idx="2">
+            <a:schemeClr val="accent1">
+              <a:shade val="15000"/>
+            </a:schemeClr>
+          </a:lnRef>
+          <a:fillRef idx="1">
+            <a:schemeClr val="accent1"/>
+          </a:fillRef>
+          <a:effectRef idx="0">
+            <a:schemeClr val="accent1"/>
+          </a:effectRef>
+          <a:fontRef idx="minor">
+            <a:schemeClr val="lt1"/>
+          </a:fontRef>
+        </p:style>
+        <p:txBody>
+          <a:bodyPr rtlCol="0" anchor="ctr"/>
+          <a:lstStyle/>
+          <a:p>
+            <a:pPr algn="ctr"/>
+            <a:endParaRPr lang="en-SG"/>
+          </a:p>
+        </p:txBody>
+      </p:sp>
+      <p:cxnSp>
+        <p:nvCxnSpPr>
+          <p:cNvPr id="15" name="Straight Arrow Connector 14">
+            <a:extLst>
+              <a:ext uri="{FF2B5EF4-FFF2-40B4-BE49-F238E27FC236}">
+                <a16:creationId xmlns:a16="http://schemas.microsoft.com/office/drawing/2014/main" id="{A8577B23-1087-02A5-B519-9470CF66E43D}"/>
+              </a:ext>
+            </a:extLst>
+          </p:cNvPr>
+          <p:cNvCxnSpPr>
+            <a:cxnSpLocks/>
+          </p:cNvCxnSpPr>
+          <p:nvPr/>
+        </p:nvCxnSpPr>
+        <p:spPr>
+          <a:xfrm flipV="1">
+            <a:off x="1696578" y="2432304"/>
+            <a:ext cx="0" cy="1335024"/>
+          </a:xfrm>
+          <a:prstGeom prst="straightConnector1">
+            <a:avLst/>
+          </a:prstGeom>
+          <a:ln>
+            <a:solidFill>
+              <a:srgbClr val="FF0000"/>
+            </a:solidFill>
+            <a:tailEnd type="triangle"/>
+          </a:ln>
+        </p:spPr>
+        <p:style>
+          <a:lnRef idx="2">
+            <a:schemeClr val="accent1"/>
+          </a:lnRef>
+          <a:fillRef idx="0">
+            <a:schemeClr val="accent1"/>
+          </a:fillRef>
+          <a:effectRef idx="1">
+            <a:schemeClr val="accent1"/>
+          </a:effectRef>
+          <a:fontRef idx="minor">
+            <a:schemeClr val="tx1"/>
+          </a:fontRef>
+        </p:style>
+      </p:cxnSp>
+      <p:cxnSp>
+        <p:nvCxnSpPr>
+          <p:cNvPr id="19" name="Straight Arrow Connector 18">
+            <a:extLst>
+              <a:ext uri="{FF2B5EF4-FFF2-40B4-BE49-F238E27FC236}">
+                <a16:creationId xmlns:a16="http://schemas.microsoft.com/office/drawing/2014/main" id="{EFF274A1-2090-0158-18D1-9555978190CE}"/>
+              </a:ext>
+            </a:extLst>
+          </p:cNvPr>
+          <p:cNvCxnSpPr>
+            <a:cxnSpLocks/>
+          </p:cNvCxnSpPr>
+          <p:nvPr/>
+        </p:nvCxnSpPr>
+        <p:spPr>
+          <a:xfrm>
+            <a:off x="1696578" y="3767328"/>
+            <a:ext cx="2198766" cy="0"/>
+          </a:xfrm>
+          <a:prstGeom prst="straightConnector1">
+            <a:avLst/>
+          </a:prstGeom>
+          <a:ln>
+            <a:solidFill>
+              <a:srgbClr val="FF0000"/>
+            </a:solidFill>
+            <a:tailEnd type="triangle"/>
+          </a:ln>
+        </p:spPr>
+        <p:style>
+          <a:lnRef idx="2">
+            <a:schemeClr val="accent1"/>
+          </a:lnRef>
+          <a:fillRef idx="0">
+            <a:schemeClr val="accent1"/>
+          </a:fillRef>
+          <a:effectRef idx="1">
+            <a:schemeClr val="accent1"/>
+          </a:effectRef>
+          <a:fontRef idx="minor">
+            <a:schemeClr val="tx1"/>
+          </a:fontRef>
+        </p:style>
+      </p:cxnSp>
+      <p:cxnSp>
+        <p:nvCxnSpPr>
+          <p:cNvPr id="22" name="Straight Arrow Connector 21">
+            <a:extLst>
+              <a:ext uri="{FF2B5EF4-FFF2-40B4-BE49-F238E27FC236}">
+                <a16:creationId xmlns:a16="http://schemas.microsoft.com/office/drawing/2014/main" id="{A005AFDF-C84C-EB1C-EC2E-AE5A07F94D8D}"/>
+              </a:ext>
+            </a:extLst>
+          </p:cNvPr>
+          <p:cNvCxnSpPr>
+            <a:cxnSpLocks/>
+          </p:cNvCxnSpPr>
+          <p:nvPr/>
+        </p:nvCxnSpPr>
+        <p:spPr>
+          <a:xfrm>
+            <a:off x="1696578" y="3767328"/>
+            <a:ext cx="974206" cy="733039"/>
+          </a:xfrm>
+          <a:prstGeom prst="straightConnector1">
+            <a:avLst/>
+          </a:prstGeom>
+          <a:ln>
+            <a:solidFill>
+              <a:srgbClr val="FF0000"/>
+            </a:solidFill>
+            <a:tailEnd type="triangle"/>
+          </a:ln>
+        </p:spPr>
+        <p:style>
+          <a:lnRef idx="2">
+            <a:schemeClr val="accent1"/>
+          </a:lnRef>
+          <a:fillRef idx="0">
+            <a:schemeClr val="accent1"/>
+          </a:fillRef>
+          <a:effectRef idx="1">
+            <a:schemeClr val="accent1"/>
+          </a:effectRef>
+          <a:fontRef idx="minor">
+            <a:schemeClr val="tx1"/>
+          </a:fontRef>
+        </p:style>
+      </p:cxnSp>
+    </p:spTree>
+    <p:extLst>
+      <p:ext uri="{BB962C8B-B14F-4D97-AF65-F5344CB8AC3E}">
+        <p14:creationId xmlns:p14="http://schemas.microsoft.com/office/powerpoint/2010/main" val="2162082605"/>
+      </p:ext>
+    </p:extLst>
+  </p:cSld>
+  <p:clrMapOvr>
+    <a:masterClrMapping/>
+  </p:clrMapOvr>
+</p:sld>
+</file>
+
+<file path=ppt/slides/slide7.xml><?xml version="1.0" encoding="utf-8"?>
+<p:sld xmlns:a="http://schemas.openxmlformats.org/drawingml/2006/main" xmlns:r="http://schemas.openxmlformats.org/officeDocument/2006/relationships" xmlns:p="http://schemas.openxmlformats.org/presentationml/2006/main">
+  <p:cSld>
+    <p:spTree>
+      <p:nvGrpSpPr>
+        <p:cNvPr id="1" name=""/>
+        <p:cNvGrpSpPr/>
+        <p:nvPr/>
+      </p:nvGrpSpPr>
+      <p:grpSpPr>
+        <a:xfrm>
+          <a:off x="0" y="0"/>
+          <a:ext cx="0" cy="0"/>
+          <a:chOff x="0" y="0"/>
+          <a:chExt cx="0" cy="0"/>
+        </a:xfrm>
+      </p:grpSpPr>
+      <p:pic>
+        <p:nvPicPr>
           <p:cNvPr id="5" name="Picture 4">
             <a:extLst>
               <a:ext uri="{FF2B5EF4-FFF2-40B4-BE49-F238E27FC236}">
-                <a16:creationId xmlns:a16="http://schemas.microsoft.com/office/drawing/2014/main" id="{25DCCBE7-5855-E504-4BE9-14D40F84697B}"/>
+                <a16:creationId xmlns:a16="http://schemas.microsoft.com/office/drawing/2014/main" id="{8FD5F713-35B3-D41E-DB8C-C9A46B1516CA}"/>
               </a:ext>
             </a:extLst>
           </p:cNvPr>
@@ -17806,17 +18330,12 @@
         </p:blipFill>
         <p:spPr>
           <a:xfrm>
-            <a:off x="553531" y="705896"/>
-            <a:ext cx="11084937" cy="5785340"/>
-          </a:xfrm>
-          <a:prstGeom prst="rect">
-            <a:avLst/>
-          </a:prstGeom>
-          <a:ln w="12700">
-            <a:solidFill>
-              <a:schemeClr val="tx1"/>
-            </a:solidFill>
-          </a:ln>
+            <a:off x="1350758" y="165769"/>
+            <a:ext cx="9062206" cy="6104402"/>
+          </a:xfrm>
+          <a:prstGeom prst="rect">
+            <a:avLst/>
+          </a:prstGeom>
         </p:spPr>
       </p:pic>
       <p:sp>
@@ -17824,7 +18343,7 @@
           <p:cNvPr id="6" name="Rectangle 5">
             <a:extLst>
               <a:ext uri="{FF2B5EF4-FFF2-40B4-BE49-F238E27FC236}">
-                <a16:creationId xmlns:a16="http://schemas.microsoft.com/office/drawing/2014/main" id="{1A3DFE94-E2A6-5107-2A2B-6A1962734D35}"/>
+                <a16:creationId xmlns:a16="http://schemas.microsoft.com/office/drawing/2014/main" id="{BE19180F-7511-EEE1-6A30-112FB36F1CFE}"/>
               </a:ext>
             </a:extLst>
           </p:cNvPr>
@@ -17833,14 +18352,14 @@
         </p:nvSpPr>
         <p:spPr>
           <a:xfrm>
-            <a:off x="3858567" y="2421653"/>
-            <a:ext cx="3516923" cy="401933"/>
+            <a:off x="2845676" y="4226395"/>
+            <a:ext cx="7501973" cy="2183735"/>
           </a:xfrm>
           <a:prstGeom prst="rect">
             <a:avLst/>
           </a:prstGeom>
           <a:noFill/>
-          <a:ln w="28575">
+          <a:ln w="19050">
             <a:solidFill>
               <a:srgbClr val="FF0000"/>
             </a:solidFill>
@@ -17877,7 +18396,7 @@
           <p:cNvPr id="7" name="Rectangle 6">
             <a:extLst>
               <a:ext uri="{FF2B5EF4-FFF2-40B4-BE49-F238E27FC236}">
-                <a16:creationId xmlns:a16="http://schemas.microsoft.com/office/drawing/2014/main" id="{E987D324-D185-6D81-D296-E26A31AB942F}"/>
+                <a16:creationId xmlns:a16="http://schemas.microsoft.com/office/drawing/2014/main" id="{45ACBA5A-F261-0932-734C-E426E52EE136}"/>
               </a:ext>
             </a:extLst>
           </p:cNvPr>
@@ -17886,14 +18405,14 @@
         </p:nvSpPr>
         <p:spPr>
           <a:xfrm>
-            <a:off x="2463521" y="3084845"/>
-            <a:ext cx="4138246" cy="1838848"/>
+            <a:off x="7464491" y="587829"/>
+            <a:ext cx="2752530" cy="836324"/>
           </a:xfrm>
           <a:prstGeom prst="rect">
             <a:avLst/>
           </a:prstGeom>
           <a:noFill/>
-          <a:ln w="28575">
+          <a:ln w="19050">
             <a:solidFill>
               <a:srgbClr val="FF0000"/>
             </a:solidFill>
@@ -17925,10 +18444,745 @@
           </a:p>
         </p:txBody>
       </p:sp>
+      <p:cxnSp>
+        <p:nvCxnSpPr>
+          <p:cNvPr id="8" name="Straight Arrow Connector 7">
+            <a:extLst>
+              <a:ext uri="{FF2B5EF4-FFF2-40B4-BE49-F238E27FC236}">
+                <a16:creationId xmlns:a16="http://schemas.microsoft.com/office/drawing/2014/main" id="{8E72189F-4B5A-F5B7-2B5B-7A310EA3BA27}"/>
+              </a:ext>
+            </a:extLst>
+          </p:cNvPr>
+          <p:cNvCxnSpPr>
+            <a:cxnSpLocks/>
+          </p:cNvCxnSpPr>
+          <p:nvPr/>
+        </p:nvCxnSpPr>
+        <p:spPr>
+          <a:xfrm flipV="1">
+            <a:off x="8966718" y="1458735"/>
+            <a:ext cx="0" cy="569822"/>
+          </a:xfrm>
+          <a:prstGeom prst="straightConnector1">
+            <a:avLst/>
+          </a:prstGeom>
+          <a:ln>
+            <a:solidFill>
+              <a:srgbClr val="FF0000"/>
+            </a:solidFill>
+            <a:tailEnd type="triangle"/>
+          </a:ln>
+        </p:spPr>
+        <p:style>
+          <a:lnRef idx="2">
+            <a:schemeClr val="accent1"/>
+          </a:lnRef>
+          <a:fillRef idx="0">
+            <a:schemeClr val="accent1"/>
+          </a:fillRef>
+          <a:effectRef idx="1">
+            <a:schemeClr val="accent1"/>
+          </a:effectRef>
+          <a:fontRef idx="minor">
+            <a:schemeClr val="tx1"/>
+          </a:fontRef>
+        </p:style>
+      </p:cxnSp>
+      <p:sp>
+        <p:nvSpPr>
+          <p:cNvPr id="9" name="TextBox 8">
+            <a:extLst>
+              <a:ext uri="{FF2B5EF4-FFF2-40B4-BE49-F238E27FC236}">
+                <a16:creationId xmlns:a16="http://schemas.microsoft.com/office/drawing/2014/main" id="{5B0CD7B4-5120-4264-B023-C201F05EF2C9}"/>
+              </a:ext>
+            </a:extLst>
+          </p:cNvPr>
+          <p:cNvSpPr txBox="1"/>
+          <p:nvPr/>
+        </p:nvSpPr>
+        <p:spPr>
+          <a:xfrm>
+            <a:off x="7966190" y="2045970"/>
+            <a:ext cx="2250831" cy="430887"/>
+          </a:xfrm>
+          <a:prstGeom prst="rect">
+            <a:avLst/>
+          </a:prstGeom>
+          <a:noFill/>
+        </p:spPr>
+        <p:txBody>
+          <a:bodyPr wrap="square" rtlCol="0">
+            <a:spAutoFit/>
+          </a:bodyPr>
+          <a:lstStyle/>
+          <a:p>
+            <a:r>
+              <a:rPr lang="en-US" sz="1100" b="1" dirty="0">
+                <a:solidFill>
+                  <a:schemeClr val="accent2">
+                    <a:lumMod val="75000"/>
+                  </a:schemeClr>
+                </a:solidFill>
+              </a:rPr>
+              <a:t>Report will be automated download</a:t>
+            </a:r>
+            <a:endParaRPr lang="en-SG" sz="1100" b="1" dirty="0">
+              <a:solidFill>
+                <a:schemeClr val="accent2">
+                  <a:lumMod val="75000"/>
+                </a:schemeClr>
+              </a:solidFill>
+            </a:endParaRPr>
+          </a:p>
+        </p:txBody>
+      </p:sp>
+      <p:cxnSp>
+        <p:nvCxnSpPr>
+          <p:cNvPr id="11" name="Straight Arrow Connector 10">
+            <a:extLst>
+              <a:ext uri="{FF2B5EF4-FFF2-40B4-BE49-F238E27FC236}">
+                <a16:creationId xmlns:a16="http://schemas.microsoft.com/office/drawing/2014/main" id="{D3921F51-88F1-15D1-C5A2-208F67ECBF7E}"/>
+              </a:ext>
+            </a:extLst>
+          </p:cNvPr>
+          <p:cNvCxnSpPr>
+            <a:cxnSpLocks/>
+          </p:cNvCxnSpPr>
+          <p:nvPr/>
+        </p:nvCxnSpPr>
+        <p:spPr>
+          <a:xfrm>
+            <a:off x="8186430" y="3998822"/>
+            <a:ext cx="0" cy="227573"/>
+          </a:xfrm>
+          <a:prstGeom prst="straightConnector1">
+            <a:avLst/>
+          </a:prstGeom>
+          <a:ln>
+            <a:solidFill>
+              <a:srgbClr val="FF0000"/>
+            </a:solidFill>
+            <a:tailEnd type="triangle"/>
+          </a:ln>
+        </p:spPr>
+        <p:style>
+          <a:lnRef idx="2">
+            <a:schemeClr val="accent1"/>
+          </a:lnRef>
+          <a:fillRef idx="0">
+            <a:schemeClr val="accent1"/>
+          </a:fillRef>
+          <a:effectRef idx="1">
+            <a:schemeClr val="accent1"/>
+          </a:effectRef>
+          <a:fontRef idx="minor">
+            <a:schemeClr val="tx1"/>
+          </a:fontRef>
+        </p:style>
+      </p:cxnSp>
+      <p:sp>
+        <p:nvSpPr>
+          <p:cNvPr id="13" name="TextBox 12">
+            <a:extLst>
+              <a:ext uri="{FF2B5EF4-FFF2-40B4-BE49-F238E27FC236}">
+                <a16:creationId xmlns:a16="http://schemas.microsoft.com/office/drawing/2014/main" id="{AF9CC06F-B84A-5DE4-9770-34A17871FBF9}"/>
+              </a:ext>
+            </a:extLst>
+          </p:cNvPr>
+          <p:cNvSpPr txBox="1"/>
+          <p:nvPr/>
+        </p:nvSpPr>
+        <p:spPr>
+          <a:xfrm>
+            <a:off x="7615670" y="3597253"/>
+            <a:ext cx="2250831" cy="261610"/>
+          </a:xfrm>
+          <a:prstGeom prst="rect">
+            <a:avLst/>
+          </a:prstGeom>
+          <a:noFill/>
+        </p:spPr>
+        <p:txBody>
+          <a:bodyPr wrap="square" rtlCol="0">
+            <a:spAutoFit/>
+          </a:bodyPr>
+          <a:lstStyle/>
+          <a:p>
+            <a:r>
+              <a:rPr lang="en-US" sz="1100" b="1" dirty="0">
+                <a:solidFill>
+                  <a:schemeClr val="accent2">
+                    <a:lumMod val="75000"/>
+                  </a:schemeClr>
+                </a:solidFill>
+              </a:rPr>
+              <a:t>Process progress log</a:t>
+            </a:r>
+            <a:endParaRPr lang="en-SG" sz="1100" b="1" dirty="0">
+              <a:solidFill>
+                <a:schemeClr val="accent2">
+                  <a:lumMod val="75000"/>
+                </a:schemeClr>
+              </a:solidFill>
+            </a:endParaRPr>
+          </a:p>
+        </p:txBody>
+      </p:sp>
     </p:spTree>
     <p:extLst>
       <p:ext uri="{BB962C8B-B14F-4D97-AF65-F5344CB8AC3E}">
-        <p14:creationId xmlns:p14="http://schemas.microsoft.com/office/powerpoint/2010/main" val="2162082605"/>
+        <p14:creationId xmlns:p14="http://schemas.microsoft.com/office/powerpoint/2010/main" val="2838353290"/>
+      </p:ext>
+    </p:extLst>
+  </p:cSld>
+  <p:clrMapOvr>
+    <a:masterClrMapping/>
+  </p:clrMapOvr>
+</p:sld>
+</file>
+
+<file path=ppt/slides/slide8.xml><?xml version="1.0" encoding="utf-8"?>
+<p:sld xmlns:a="http://schemas.openxmlformats.org/drawingml/2006/main" xmlns:r="http://schemas.openxmlformats.org/officeDocument/2006/relationships" xmlns:p="http://schemas.openxmlformats.org/presentationml/2006/main">
+  <p:cSld>
+    <p:spTree>
+      <p:nvGrpSpPr>
+        <p:cNvPr id="1" name=""/>
+        <p:cNvGrpSpPr/>
+        <p:nvPr/>
+      </p:nvGrpSpPr>
+      <p:grpSpPr>
+        <a:xfrm>
+          <a:off x="0" y="0"/>
+          <a:ext cx="0" cy="0"/>
+          <a:chOff x="0" y="0"/>
+          <a:chExt cx="0" cy="0"/>
+        </a:xfrm>
+      </p:grpSpPr>
+      <p:pic>
+        <p:nvPicPr>
+          <p:cNvPr id="5" name="Picture 4">
+            <a:extLst>
+              <a:ext uri="{FF2B5EF4-FFF2-40B4-BE49-F238E27FC236}">
+                <a16:creationId xmlns:a16="http://schemas.microsoft.com/office/drawing/2014/main" id="{16F7390B-2956-1B9E-F9B1-49AF459668D0}"/>
+              </a:ext>
+            </a:extLst>
+          </p:cNvPr>
+          <p:cNvPicPr>
+            <a:picLocks noChangeAspect="1"/>
+          </p:cNvPicPr>
+          <p:nvPr/>
+        </p:nvPicPr>
+        <p:blipFill>
+          <a:blip r:embed="rId2"/>
+          <a:stretch>
+            <a:fillRect/>
+          </a:stretch>
+        </p:blipFill>
+        <p:spPr>
+          <a:xfrm>
+            <a:off x="1279845" y="567806"/>
+            <a:ext cx="8495091" cy="5722387"/>
+          </a:xfrm>
+          <a:prstGeom prst="rect">
+            <a:avLst/>
+          </a:prstGeom>
+        </p:spPr>
+      </p:pic>
+      <p:sp>
+        <p:nvSpPr>
+          <p:cNvPr id="6" name="Rectangle 5">
+            <a:extLst>
+              <a:ext uri="{FF2B5EF4-FFF2-40B4-BE49-F238E27FC236}">
+                <a16:creationId xmlns:a16="http://schemas.microsoft.com/office/drawing/2014/main" id="{B58E5E21-365F-FFF4-449F-E9F33AE1029A}"/>
+              </a:ext>
+            </a:extLst>
+          </p:cNvPr>
+          <p:cNvSpPr/>
+          <p:nvPr/>
+        </p:nvSpPr>
+        <p:spPr>
+          <a:xfrm>
+            <a:off x="2836053" y="3867913"/>
+            <a:ext cx="6719423" cy="1042416"/>
+          </a:xfrm>
+          <a:prstGeom prst="rect">
+            <a:avLst/>
+          </a:prstGeom>
+          <a:noFill/>
+          <a:ln w="19050">
+            <a:solidFill>
+              <a:srgbClr val="FF0000"/>
+            </a:solidFill>
+            <a:prstDash val="sysDash"/>
+          </a:ln>
+        </p:spPr>
+        <p:style>
+          <a:lnRef idx="2">
+            <a:schemeClr val="accent1">
+              <a:shade val="15000"/>
+            </a:schemeClr>
+          </a:lnRef>
+          <a:fillRef idx="1">
+            <a:schemeClr val="accent1"/>
+          </a:fillRef>
+          <a:effectRef idx="0">
+            <a:schemeClr val="accent1"/>
+          </a:effectRef>
+          <a:fontRef idx="minor">
+            <a:schemeClr val="lt1"/>
+          </a:fontRef>
+        </p:style>
+        <p:txBody>
+          <a:bodyPr rtlCol="0" anchor="ctr"/>
+          <a:lstStyle/>
+          <a:p>
+            <a:pPr algn="ctr"/>
+            <a:endParaRPr lang="en-SG"/>
+          </a:p>
+        </p:txBody>
+      </p:sp>
+      <p:cxnSp>
+        <p:nvCxnSpPr>
+          <p:cNvPr id="7" name="Straight Arrow Connector 6">
+            <a:extLst>
+              <a:ext uri="{FF2B5EF4-FFF2-40B4-BE49-F238E27FC236}">
+                <a16:creationId xmlns:a16="http://schemas.microsoft.com/office/drawing/2014/main" id="{B7454B8B-790F-170D-84E8-1D91AAF94CF8}"/>
+              </a:ext>
+            </a:extLst>
+          </p:cNvPr>
+          <p:cNvCxnSpPr>
+            <a:cxnSpLocks/>
+          </p:cNvCxnSpPr>
+          <p:nvPr/>
+        </p:nvCxnSpPr>
+        <p:spPr>
+          <a:xfrm flipV="1">
+            <a:off x="1733154" y="2587752"/>
+            <a:ext cx="0" cy="1335024"/>
+          </a:xfrm>
+          <a:prstGeom prst="straightConnector1">
+            <a:avLst/>
+          </a:prstGeom>
+          <a:ln>
+            <a:solidFill>
+              <a:srgbClr val="FF0000"/>
+            </a:solidFill>
+            <a:tailEnd type="triangle"/>
+          </a:ln>
+        </p:spPr>
+        <p:style>
+          <a:lnRef idx="2">
+            <a:schemeClr val="accent1"/>
+          </a:lnRef>
+          <a:fillRef idx="0">
+            <a:schemeClr val="accent1"/>
+          </a:fillRef>
+          <a:effectRef idx="1">
+            <a:schemeClr val="accent1"/>
+          </a:effectRef>
+          <a:fontRef idx="minor">
+            <a:schemeClr val="tx1"/>
+          </a:fontRef>
+        </p:style>
+      </p:cxnSp>
+      <p:cxnSp>
+        <p:nvCxnSpPr>
+          <p:cNvPr id="8" name="Straight Arrow Connector 7">
+            <a:extLst>
+              <a:ext uri="{FF2B5EF4-FFF2-40B4-BE49-F238E27FC236}">
+                <a16:creationId xmlns:a16="http://schemas.microsoft.com/office/drawing/2014/main" id="{9A078EF6-DE73-1424-5AFC-6D31D742F3B9}"/>
+              </a:ext>
+            </a:extLst>
+          </p:cNvPr>
+          <p:cNvCxnSpPr>
+            <a:cxnSpLocks/>
+          </p:cNvCxnSpPr>
+          <p:nvPr/>
+        </p:nvCxnSpPr>
+        <p:spPr>
+          <a:xfrm>
+            <a:off x="1733154" y="3922776"/>
+            <a:ext cx="1102900" cy="0"/>
+          </a:xfrm>
+          <a:prstGeom prst="straightConnector1">
+            <a:avLst/>
+          </a:prstGeom>
+          <a:ln>
+            <a:solidFill>
+              <a:srgbClr val="FF0000"/>
+            </a:solidFill>
+            <a:tailEnd type="triangle"/>
+          </a:ln>
+        </p:spPr>
+        <p:style>
+          <a:lnRef idx="2">
+            <a:schemeClr val="accent1"/>
+          </a:lnRef>
+          <a:fillRef idx="0">
+            <a:schemeClr val="accent1"/>
+          </a:fillRef>
+          <a:effectRef idx="1">
+            <a:schemeClr val="accent1"/>
+          </a:effectRef>
+          <a:fontRef idx="minor">
+            <a:schemeClr val="tx1"/>
+          </a:fontRef>
+        </p:style>
+      </p:cxnSp>
+      <p:cxnSp>
+        <p:nvCxnSpPr>
+          <p:cNvPr id="9" name="Straight Arrow Connector 8">
+            <a:extLst>
+              <a:ext uri="{FF2B5EF4-FFF2-40B4-BE49-F238E27FC236}">
+                <a16:creationId xmlns:a16="http://schemas.microsoft.com/office/drawing/2014/main" id="{438B9DA2-F1DD-DFB2-FB78-8C70E7FE3CEE}"/>
+              </a:ext>
+            </a:extLst>
+          </p:cNvPr>
+          <p:cNvCxnSpPr>
+            <a:cxnSpLocks/>
+          </p:cNvCxnSpPr>
+          <p:nvPr/>
+        </p:nvCxnSpPr>
+        <p:spPr>
+          <a:xfrm>
+            <a:off x="1733154" y="3922776"/>
+            <a:ext cx="1102900" cy="1143000"/>
+          </a:xfrm>
+          <a:prstGeom prst="straightConnector1">
+            <a:avLst/>
+          </a:prstGeom>
+          <a:ln>
+            <a:solidFill>
+              <a:srgbClr val="FF0000"/>
+            </a:solidFill>
+            <a:tailEnd type="triangle"/>
+          </a:ln>
+        </p:spPr>
+        <p:style>
+          <a:lnRef idx="2">
+            <a:schemeClr val="accent1"/>
+          </a:lnRef>
+          <a:fillRef idx="0">
+            <a:schemeClr val="accent1"/>
+          </a:fillRef>
+          <a:effectRef idx="1">
+            <a:schemeClr val="accent1"/>
+          </a:effectRef>
+          <a:fontRef idx="minor">
+            <a:schemeClr val="tx1"/>
+          </a:fontRef>
+        </p:style>
+      </p:cxnSp>
+    </p:spTree>
+    <p:extLst>
+      <p:ext uri="{BB962C8B-B14F-4D97-AF65-F5344CB8AC3E}">
+        <p14:creationId xmlns:p14="http://schemas.microsoft.com/office/powerpoint/2010/main" val="3126101124"/>
+      </p:ext>
+    </p:extLst>
+  </p:cSld>
+  <p:clrMapOvr>
+    <a:masterClrMapping/>
+  </p:clrMapOvr>
+</p:sld>
+</file>
+
+<file path=ppt/slides/slide9.xml><?xml version="1.0" encoding="utf-8"?>
+<p:sld xmlns:a="http://schemas.openxmlformats.org/drawingml/2006/main" xmlns:r="http://schemas.openxmlformats.org/officeDocument/2006/relationships" xmlns:p="http://schemas.openxmlformats.org/presentationml/2006/main">
+  <p:cSld>
+    <p:spTree>
+      <p:nvGrpSpPr>
+        <p:cNvPr id="1" name=""/>
+        <p:cNvGrpSpPr/>
+        <p:nvPr/>
+      </p:nvGrpSpPr>
+      <p:grpSpPr>
+        <a:xfrm>
+          <a:off x="0" y="0"/>
+          <a:ext cx="0" cy="0"/>
+          <a:chOff x="0" y="0"/>
+          <a:chExt cx="0" cy="0"/>
+        </a:xfrm>
+      </p:grpSpPr>
+      <p:pic>
+        <p:nvPicPr>
+          <p:cNvPr id="5" name="Picture 4">
+            <a:extLst>
+              <a:ext uri="{FF2B5EF4-FFF2-40B4-BE49-F238E27FC236}">
+                <a16:creationId xmlns:a16="http://schemas.microsoft.com/office/drawing/2014/main" id="{65312D75-B2E7-EF72-495F-8FBC2E1233F9}"/>
+              </a:ext>
+            </a:extLst>
+          </p:cNvPr>
+          <p:cNvPicPr>
+            <a:picLocks noChangeAspect="1"/>
+          </p:cNvPicPr>
+          <p:nvPr/>
+        </p:nvPicPr>
+        <p:blipFill>
+          <a:blip r:embed="rId2"/>
+          <a:stretch>
+            <a:fillRect/>
+          </a:stretch>
+        </p:blipFill>
+        <p:spPr>
+          <a:xfrm>
+            <a:off x="990728" y="386884"/>
+            <a:ext cx="8875773" cy="5929484"/>
+          </a:xfrm>
+          <a:prstGeom prst="rect">
+            <a:avLst/>
+          </a:prstGeom>
+        </p:spPr>
+      </p:pic>
+      <p:sp>
+        <p:nvSpPr>
+          <p:cNvPr id="7" name="Rectangle 6">
+            <a:extLst>
+              <a:ext uri="{FF2B5EF4-FFF2-40B4-BE49-F238E27FC236}">
+                <a16:creationId xmlns:a16="http://schemas.microsoft.com/office/drawing/2014/main" id="{3CA7A5BA-2A3F-A188-1DF9-4659636E5772}"/>
+              </a:ext>
+            </a:extLst>
+          </p:cNvPr>
+          <p:cNvSpPr/>
+          <p:nvPr/>
+        </p:nvSpPr>
+        <p:spPr>
+          <a:xfrm>
+            <a:off x="2364529" y="4135943"/>
+            <a:ext cx="7410408" cy="1862637"/>
+          </a:xfrm>
+          <a:prstGeom prst="rect">
+            <a:avLst/>
+          </a:prstGeom>
+          <a:noFill/>
+          <a:ln w="19050">
+            <a:solidFill>
+              <a:srgbClr val="FF0000"/>
+            </a:solidFill>
+            <a:prstDash val="sysDash"/>
+          </a:ln>
+        </p:spPr>
+        <p:style>
+          <a:lnRef idx="2">
+            <a:schemeClr val="accent1">
+              <a:shade val="15000"/>
+            </a:schemeClr>
+          </a:lnRef>
+          <a:fillRef idx="1">
+            <a:schemeClr val="accent1"/>
+          </a:fillRef>
+          <a:effectRef idx="0">
+            <a:schemeClr val="accent1"/>
+          </a:effectRef>
+          <a:fontRef idx="minor">
+            <a:schemeClr val="lt1"/>
+          </a:fontRef>
+        </p:style>
+        <p:txBody>
+          <a:bodyPr rtlCol="0" anchor="ctr"/>
+          <a:lstStyle/>
+          <a:p>
+            <a:pPr algn="ctr"/>
+            <a:endParaRPr lang="en-SG"/>
+          </a:p>
+        </p:txBody>
+      </p:sp>
+      <p:sp>
+        <p:nvSpPr>
+          <p:cNvPr id="8" name="Rectangle 7">
+            <a:extLst>
+              <a:ext uri="{FF2B5EF4-FFF2-40B4-BE49-F238E27FC236}">
+                <a16:creationId xmlns:a16="http://schemas.microsoft.com/office/drawing/2014/main" id="{EC0CFA04-2622-242B-FC3F-DCCF63335E22}"/>
+              </a:ext>
+            </a:extLst>
+          </p:cNvPr>
+          <p:cNvSpPr/>
+          <p:nvPr/>
+        </p:nvSpPr>
+        <p:spPr>
+          <a:xfrm>
+            <a:off x="7113971" y="859420"/>
+            <a:ext cx="2752530" cy="836324"/>
+          </a:xfrm>
+          <a:prstGeom prst="rect">
+            <a:avLst/>
+          </a:prstGeom>
+          <a:noFill/>
+          <a:ln w="19050">
+            <a:solidFill>
+              <a:srgbClr val="FF0000"/>
+            </a:solidFill>
+            <a:prstDash val="sysDash"/>
+          </a:ln>
+        </p:spPr>
+        <p:style>
+          <a:lnRef idx="2">
+            <a:schemeClr val="accent1">
+              <a:shade val="15000"/>
+            </a:schemeClr>
+          </a:lnRef>
+          <a:fillRef idx="1">
+            <a:schemeClr val="accent1"/>
+          </a:fillRef>
+          <a:effectRef idx="0">
+            <a:schemeClr val="accent1"/>
+          </a:effectRef>
+          <a:fontRef idx="minor">
+            <a:schemeClr val="lt1"/>
+          </a:fontRef>
+        </p:style>
+        <p:txBody>
+          <a:bodyPr rtlCol="0" anchor="ctr"/>
+          <a:lstStyle/>
+          <a:p>
+            <a:pPr algn="ctr"/>
+            <a:endParaRPr lang="en-SG"/>
+          </a:p>
+        </p:txBody>
+      </p:sp>
+      <p:cxnSp>
+        <p:nvCxnSpPr>
+          <p:cNvPr id="9" name="Straight Arrow Connector 8">
+            <a:extLst>
+              <a:ext uri="{FF2B5EF4-FFF2-40B4-BE49-F238E27FC236}">
+                <a16:creationId xmlns:a16="http://schemas.microsoft.com/office/drawing/2014/main" id="{9EE65FFA-3F4B-6066-E206-83095B1F30B9}"/>
+              </a:ext>
+            </a:extLst>
+          </p:cNvPr>
+          <p:cNvCxnSpPr>
+            <a:cxnSpLocks/>
+          </p:cNvCxnSpPr>
+          <p:nvPr/>
+        </p:nvCxnSpPr>
+        <p:spPr>
+          <a:xfrm>
+            <a:off x="6600085" y="1003262"/>
+            <a:ext cx="894449" cy="343459"/>
+          </a:xfrm>
+          <a:prstGeom prst="straightConnector1">
+            <a:avLst/>
+          </a:prstGeom>
+          <a:ln>
+            <a:solidFill>
+              <a:srgbClr val="FF0000"/>
+            </a:solidFill>
+            <a:tailEnd type="triangle"/>
+          </a:ln>
+        </p:spPr>
+        <p:style>
+          <a:lnRef idx="2">
+            <a:schemeClr val="accent1"/>
+          </a:lnRef>
+          <a:fillRef idx="0">
+            <a:schemeClr val="accent1"/>
+          </a:fillRef>
+          <a:effectRef idx="1">
+            <a:schemeClr val="accent1"/>
+          </a:effectRef>
+          <a:fontRef idx="minor">
+            <a:schemeClr val="tx1"/>
+          </a:fontRef>
+        </p:style>
+      </p:cxnSp>
+      <p:sp>
+        <p:nvSpPr>
+          <p:cNvPr id="10" name="TextBox 9">
+            <a:extLst>
+              <a:ext uri="{FF2B5EF4-FFF2-40B4-BE49-F238E27FC236}">
+                <a16:creationId xmlns:a16="http://schemas.microsoft.com/office/drawing/2014/main" id="{268F123E-9F55-9F96-0529-EA48EC491AD1}"/>
+              </a:ext>
+            </a:extLst>
+          </p:cNvPr>
+          <p:cNvSpPr txBox="1"/>
+          <p:nvPr/>
+        </p:nvSpPr>
+        <p:spPr>
+          <a:xfrm>
+            <a:off x="5591916" y="643976"/>
+            <a:ext cx="2250831" cy="430887"/>
+          </a:xfrm>
+          <a:prstGeom prst="rect">
+            <a:avLst/>
+          </a:prstGeom>
+          <a:noFill/>
+        </p:spPr>
+        <p:txBody>
+          <a:bodyPr wrap="square" rtlCol="0">
+            <a:spAutoFit/>
+          </a:bodyPr>
+          <a:lstStyle/>
+          <a:p>
+            <a:r>
+              <a:rPr lang="en-US" sz="1100" b="1" dirty="0">
+                <a:solidFill>
+                  <a:schemeClr val="accent2">
+                    <a:lumMod val="75000"/>
+                  </a:schemeClr>
+                </a:solidFill>
+              </a:rPr>
+              <a:t>Report will be automated download</a:t>
+            </a:r>
+            <a:endParaRPr lang="en-SG" sz="1100" b="1" dirty="0">
+              <a:solidFill>
+                <a:schemeClr val="accent2">
+                  <a:lumMod val="75000"/>
+                </a:schemeClr>
+              </a:solidFill>
+            </a:endParaRPr>
+          </a:p>
+        </p:txBody>
+      </p:sp>
+      <p:sp>
+        <p:nvSpPr>
+          <p:cNvPr id="11" name="TextBox 10">
+            <a:extLst>
+              <a:ext uri="{FF2B5EF4-FFF2-40B4-BE49-F238E27FC236}">
+                <a16:creationId xmlns:a16="http://schemas.microsoft.com/office/drawing/2014/main" id="{38D78F79-35F2-0913-BBAB-5872F90B11CA}"/>
+              </a:ext>
+            </a:extLst>
+          </p:cNvPr>
+          <p:cNvSpPr txBox="1"/>
+          <p:nvPr/>
+        </p:nvSpPr>
+        <p:spPr>
+          <a:xfrm>
+            <a:off x="7966189" y="4786251"/>
+            <a:ext cx="2250831" cy="261610"/>
+          </a:xfrm>
+          <a:prstGeom prst="rect">
+            <a:avLst/>
+          </a:prstGeom>
+          <a:noFill/>
+        </p:spPr>
+        <p:txBody>
+          <a:bodyPr wrap="square" rtlCol="0">
+            <a:spAutoFit/>
+          </a:bodyPr>
+          <a:lstStyle/>
+          <a:p>
+            <a:r>
+              <a:rPr lang="en-US" sz="1100" b="1" dirty="0">
+                <a:solidFill>
+                  <a:schemeClr val="accent2">
+                    <a:lumMod val="75000"/>
+                  </a:schemeClr>
+                </a:solidFill>
+              </a:rPr>
+              <a:t>Process progress log</a:t>
+            </a:r>
+            <a:endParaRPr lang="en-SG" sz="1100" b="1" dirty="0">
+              <a:solidFill>
+                <a:schemeClr val="accent2">
+                  <a:lumMod val="75000"/>
+                </a:schemeClr>
+              </a:solidFill>
+            </a:endParaRPr>
+          </a:p>
+        </p:txBody>
+      </p:sp>
+    </p:spTree>
+    <p:extLst>
+      <p:ext uri="{BB962C8B-B14F-4D97-AF65-F5344CB8AC3E}">
+        <p14:creationId xmlns:p14="http://schemas.microsoft.com/office/powerpoint/2010/main" val="1955388286"/>
       </p:ext>
     </p:extLst>
   </p:cSld>

</xml_diff>